<commit_message>
Font changes, variables listed in explanation.
</commit_message>
<xml_diff>
--- a/Data Wizards Project #1.pptx
+++ b/Data Wizards Project #1.pptx
@@ -4,10 +4,13 @@
   <p:sldMasterIdLst>
     <p:sldMasterId id="2147483660" r:id="rId1"/>
   </p:sldMasterIdLst>
+  <p:notesMasterIdLst>
+    <p:notesMasterId r:id="rId14"/>
+  </p:notesMasterIdLst>
   <p:sldIdLst>
     <p:sldId id="256" r:id="rId2"/>
-    <p:sldId id="257" r:id="rId3"/>
-    <p:sldId id="261" r:id="rId4"/>
+    <p:sldId id="261" r:id="rId3"/>
+    <p:sldId id="257" r:id="rId4"/>
     <p:sldId id="258" r:id="rId5"/>
     <p:sldId id="263" r:id="rId6"/>
     <p:sldId id="259" r:id="rId7"/>
@@ -121,8 +124,8 @@
         <p14:section name="Default Section" id="{43E99D20-4413-43DC-8B82-738001EFE5FF}">
           <p14:sldIdLst>
             <p14:sldId id="256"/>
+            <p14:sldId id="261"/>
             <p14:sldId id="257"/>
-            <p14:sldId id="261"/>
             <p14:sldId id="258"/>
             <p14:sldId id="263"/>
             <p14:sldId id="259"/>
@@ -136,8 +139,1404 @@
         </p14:section>
       </p14:sectionLst>
     </p:ext>
+    <p:ext uri="{EFAFB233-063F-42B5-8137-9DF3F51BA10A}">
+      <p15:sldGuideLst xmlns:p15="http://schemas.microsoft.com/office/powerpoint/2012/main"/>
+    </p:ext>
   </p:extLst>
 </p:presentation>
+</file>
+
+<file path=ppt/notesMasters/notesMaster1.xml><?xml version="1.0" encoding="utf-8"?>
+<p:notesMaster xmlns:a="http://schemas.openxmlformats.org/drawingml/2006/main" xmlns:r="http://schemas.openxmlformats.org/officeDocument/2006/relationships" xmlns:p="http://schemas.openxmlformats.org/presentationml/2006/main">
+  <p:cSld>
+    <p:bg>
+      <p:bgRef idx="1001">
+        <a:schemeClr val="bg1"/>
+      </p:bgRef>
+    </p:bg>
+    <p:spTree>
+      <p:nvGrpSpPr>
+        <p:cNvPr id="1" name=""/>
+        <p:cNvGrpSpPr/>
+        <p:nvPr/>
+      </p:nvGrpSpPr>
+      <p:grpSpPr>
+        <a:xfrm>
+          <a:off x="0" y="0"/>
+          <a:ext cx="0" cy="0"/>
+          <a:chOff x="0" y="0"/>
+          <a:chExt cx="0" cy="0"/>
+        </a:xfrm>
+      </p:grpSpPr>
+      <p:sp>
+        <p:nvSpPr>
+          <p:cNvPr id="2" name="Header Placeholder 1"/>
+          <p:cNvSpPr>
+            <a:spLocks noGrp="1"/>
+          </p:cNvSpPr>
+          <p:nvPr>
+            <p:ph type="hdr" sz="quarter"/>
+          </p:nvPr>
+        </p:nvSpPr>
+        <p:spPr>
+          <a:xfrm>
+            <a:off x="0" y="0"/>
+            <a:ext cx="2971800" cy="458788"/>
+          </a:xfrm>
+          <a:prstGeom prst="rect">
+            <a:avLst/>
+          </a:prstGeom>
+        </p:spPr>
+        <p:txBody>
+          <a:bodyPr vert="horz" lIns="91440" tIns="45720" rIns="91440" bIns="45720" rtlCol="0"/>
+          <a:lstStyle>
+            <a:lvl1pPr algn="l">
+              <a:defRPr sz="1200"/>
+            </a:lvl1pPr>
+          </a:lstStyle>
+          <a:p>
+            <a:endParaRPr lang="en-US"/>
+          </a:p>
+        </p:txBody>
+      </p:sp>
+      <p:sp>
+        <p:nvSpPr>
+          <p:cNvPr id="3" name="Date Placeholder 2"/>
+          <p:cNvSpPr>
+            <a:spLocks noGrp="1"/>
+          </p:cNvSpPr>
+          <p:nvPr>
+            <p:ph type="dt" idx="1"/>
+          </p:nvPr>
+        </p:nvSpPr>
+        <p:spPr>
+          <a:xfrm>
+            <a:off x="3884613" y="0"/>
+            <a:ext cx="2971800" cy="458788"/>
+          </a:xfrm>
+          <a:prstGeom prst="rect">
+            <a:avLst/>
+          </a:prstGeom>
+        </p:spPr>
+        <p:txBody>
+          <a:bodyPr vert="horz" lIns="91440" tIns="45720" rIns="91440" bIns="45720" rtlCol="0"/>
+          <a:lstStyle>
+            <a:lvl1pPr algn="r">
+              <a:defRPr sz="1200"/>
+            </a:lvl1pPr>
+          </a:lstStyle>
+          <a:p>
+            <a:fld id="{7C220EF8-5A43-4173-B818-371C7C257391}" type="datetimeFigureOut">
+              <a:rPr lang="en-US" smtClean="0"/>
+              <a:t>5/1/2024</a:t>
+            </a:fld>
+            <a:endParaRPr lang="en-US"/>
+          </a:p>
+        </p:txBody>
+      </p:sp>
+      <p:sp>
+        <p:nvSpPr>
+          <p:cNvPr id="4" name="Slide Image Placeholder 3"/>
+          <p:cNvSpPr>
+            <a:spLocks noGrp="1" noRot="1" noChangeAspect="1"/>
+          </p:cNvSpPr>
+          <p:nvPr>
+            <p:ph type="sldImg" idx="2"/>
+          </p:nvPr>
+        </p:nvSpPr>
+        <p:spPr>
+          <a:xfrm>
+            <a:off x="685800" y="1143000"/>
+            <a:ext cx="5486400" cy="3086100"/>
+          </a:xfrm>
+          <a:prstGeom prst="rect">
+            <a:avLst/>
+          </a:prstGeom>
+          <a:noFill/>
+          <a:ln w="12700">
+            <a:solidFill>
+              <a:prstClr val="black"/>
+            </a:solidFill>
+          </a:ln>
+        </p:spPr>
+        <p:txBody>
+          <a:bodyPr vert="horz" lIns="91440" tIns="45720" rIns="91440" bIns="45720" rtlCol="0" anchor="ctr"/>
+          <a:lstStyle/>
+          <a:p>
+            <a:endParaRPr lang="en-US"/>
+          </a:p>
+        </p:txBody>
+      </p:sp>
+      <p:sp>
+        <p:nvSpPr>
+          <p:cNvPr id="5" name="Notes Placeholder 4"/>
+          <p:cNvSpPr>
+            <a:spLocks noGrp="1"/>
+          </p:cNvSpPr>
+          <p:nvPr>
+            <p:ph type="body" sz="quarter" idx="3"/>
+          </p:nvPr>
+        </p:nvSpPr>
+        <p:spPr>
+          <a:xfrm>
+            <a:off x="685800" y="4400550"/>
+            <a:ext cx="5486400" cy="3600450"/>
+          </a:xfrm>
+          <a:prstGeom prst="rect">
+            <a:avLst/>
+          </a:prstGeom>
+        </p:spPr>
+        <p:txBody>
+          <a:bodyPr vert="horz" lIns="91440" tIns="45720" rIns="91440" bIns="45720" rtlCol="0"/>
+          <a:lstStyle/>
+          <a:p>
+            <a:pPr lvl="0"/>
+            <a:r>
+              <a:rPr lang="en-US"/>
+              <a:t>Click to edit Master text styles</a:t>
+            </a:r>
+          </a:p>
+          <a:p>
+            <a:pPr lvl="1"/>
+            <a:r>
+              <a:rPr lang="en-US"/>
+              <a:t>Second level</a:t>
+            </a:r>
+          </a:p>
+          <a:p>
+            <a:pPr lvl="2"/>
+            <a:r>
+              <a:rPr lang="en-US"/>
+              <a:t>Third level</a:t>
+            </a:r>
+          </a:p>
+          <a:p>
+            <a:pPr lvl="3"/>
+            <a:r>
+              <a:rPr lang="en-US"/>
+              <a:t>Fourth level</a:t>
+            </a:r>
+          </a:p>
+          <a:p>
+            <a:pPr lvl="4"/>
+            <a:r>
+              <a:rPr lang="en-US"/>
+              <a:t>Fifth level</a:t>
+            </a:r>
+          </a:p>
+        </p:txBody>
+      </p:sp>
+      <p:sp>
+        <p:nvSpPr>
+          <p:cNvPr id="6" name="Footer Placeholder 5"/>
+          <p:cNvSpPr>
+            <a:spLocks noGrp="1"/>
+          </p:cNvSpPr>
+          <p:nvPr>
+            <p:ph type="ftr" sz="quarter" idx="4"/>
+          </p:nvPr>
+        </p:nvSpPr>
+        <p:spPr>
+          <a:xfrm>
+            <a:off x="0" y="8685213"/>
+            <a:ext cx="2971800" cy="458787"/>
+          </a:xfrm>
+          <a:prstGeom prst="rect">
+            <a:avLst/>
+          </a:prstGeom>
+        </p:spPr>
+        <p:txBody>
+          <a:bodyPr vert="horz" lIns="91440" tIns="45720" rIns="91440" bIns="45720" rtlCol="0" anchor="b"/>
+          <a:lstStyle>
+            <a:lvl1pPr algn="l">
+              <a:defRPr sz="1200"/>
+            </a:lvl1pPr>
+          </a:lstStyle>
+          <a:p>
+            <a:endParaRPr lang="en-US"/>
+          </a:p>
+        </p:txBody>
+      </p:sp>
+      <p:sp>
+        <p:nvSpPr>
+          <p:cNvPr id="7" name="Slide Number Placeholder 6"/>
+          <p:cNvSpPr>
+            <a:spLocks noGrp="1"/>
+          </p:cNvSpPr>
+          <p:nvPr>
+            <p:ph type="sldNum" sz="quarter" idx="5"/>
+          </p:nvPr>
+        </p:nvSpPr>
+        <p:spPr>
+          <a:xfrm>
+            <a:off x="3884613" y="8685213"/>
+            <a:ext cx="2971800" cy="458787"/>
+          </a:xfrm>
+          <a:prstGeom prst="rect">
+            <a:avLst/>
+          </a:prstGeom>
+        </p:spPr>
+        <p:txBody>
+          <a:bodyPr vert="horz" lIns="91440" tIns="45720" rIns="91440" bIns="45720" rtlCol="0" anchor="b"/>
+          <a:lstStyle>
+            <a:lvl1pPr algn="r">
+              <a:defRPr sz="1200"/>
+            </a:lvl1pPr>
+          </a:lstStyle>
+          <a:p>
+            <a:fld id="{0B1519F3-A86B-48DF-8F7A-0713D35571C6}" type="slidenum">
+              <a:rPr lang="en-US" smtClean="0"/>
+              <a:t>‹#›</a:t>
+            </a:fld>
+            <a:endParaRPr lang="en-US"/>
+          </a:p>
+        </p:txBody>
+      </p:sp>
+    </p:spTree>
+    <p:extLst>
+      <p:ext uri="{BB962C8B-B14F-4D97-AF65-F5344CB8AC3E}">
+        <p14:creationId xmlns:p14="http://schemas.microsoft.com/office/powerpoint/2010/main" val="819652929"/>
+      </p:ext>
+    </p:extLst>
+  </p:cSld>
+  <p:clrMap bg1="lt1" tx1="dk1" bg2="lt2" tx2="dk2" accent1="accent1" accent2="accent2" accent3="accent3" accent4="accent4" accent5="accent5" accent6="accent6" hlink="hlink" folHlink="folHlink"/>
+  <p:notesStyle>
+    <a:lvl1pPr marL="0" algn="l" defTabSz="914400" rtl="0" eaLnBrk="1" latinLnBrk="0" hangingPunct="1">
+      <a:defRPr sz="1200" kern="1200">
+        <a:solidFill>
+          <a:schemeClr val="tx1"/>
+        </a:solidFill>
+        <a:latin typeface="+mn-lt"/>
+        <a:ea typeface="+mn-ea"/>
+        <a:cs typeface="+mn-cs"/>
+      </a:defRPr>
+    </a:lvl1pPr>
+    <a:lvl2pPr marL="457200" algn="l" defTabSz="914400" rtl="0" eaLnBrk="1" latinLnBrk="0" hangingPunct="1">
+      <a:defRPr sz="1200" kern="1200">
+        <a:solidFill>
+          <a:schemeClr val="tx1"/>
+        </a:solidFill>
+        <a:latin typeface="+mn-lt"/>
+        <a:ea typeface="+mn-ea"/>
+        <a:cs typeface="+mn-cs"/>
+      </a:defRPr>
+    </a:lvl2pPr>
+    <a:lvl3pPr marL="914400" algn="l" defTabSz="914400" rtl="0" eaLnBrk="1" latinLnBrk="0" hangingPunct="1">
+      <a:defRPr sz="1200" kern="1200">
+        <a:solidFill>
+          <a:schemeClr val="tx1"/>
+        </a:solidFill>
+        <a:latin typeface="+mn-lt"/>
+        <a:ea typeface="+mn-ea"/>
+        <a:cs typeface="+mn-cs"/>
+      </a:defRPr>
+    </a:lvl3pPr>
+    <a:lvl4pPr marL="1371600" algn="l" defTabSz="914400" rtl="0" eaLnBrk="1" latinLnBrk="0" hangingPunct="1">
+      <a:defRPr sz="1200" kern="1200">
+        <a:solidFill>
+          <a:schemeClr val="tx1"/>
+        </a:solidFill>
+        <a:latin typeface="+mn-lt"/>
+        <a:ea typeface="+mn-ea"/>
+        <a:cs typeface="+mn-cs"/>
+      </a:defRPr>
+    </a:lvl4pPr>
+    <a:lvl5pPr marL="1828800" algn="l" defTabSz="914400" rtl="0" eaLnBrk="1" latinLnBrk="0" hangingPunct="1">
+      <a:defRPr sz="1200" kern="1200">
+        <a:solidFill>
+          <a:schemeClr val="tx1"/>
+        </a:solidFill>
+        <a:latin typeface="+mn-lt"/>
+        <a:ea typeface="+mn-ea"/>
+        <a:cs typeface="+mn-cs"/>
+      </a:defRPr>
+    </a:lvl5pPr>
+    <a:lvl6pPr marL="2286000" algn="l" defTabSz="914400" rtl="0" eaLnBrk="1" latinLnBrk="0" hangingPunct="1">
+      <a:defRPr sz="1200" kern="1200">
+        <a:solidFill>
+          <a:schemeClr val="tx1"/>
+        </a:solidFill>
+        <a:latin typeface="+mn-lt"/>
+        <a:ea typeface="+mn-ea"/>
+        <a:cs typeface="+mn-cs"/>
+      </a:defRPr>
+    </a:lvl6pPr>
+    <a:lvl7pPr marL="2743200" algn="l" defTabSz="914400" rtl="0" eaLnBrk="1" latinLnBrk="0" hangingPunct="1">
+      <a:defRPr sz="1200" kern="1200">
+        <a:solidFill>
+          <a:schemeClr val="tx1"/>
+        </a:solidFill>
+        <a:latin typeface="+mn-lt"/>
+        <a:ea typeface="+mn-ea"/>
+        <a:cs typeface="+mn-cs"/>
+      </a:defRPr>
+    </a:lvl7pPr>
+    <a:lvl8pPr marL="3200400" algn="l" defTabSz="914400" rtl="0" eaLnBrk="1" latinLnBrk="0" hangingPunct="1">
+      <a:defRPr sz="1200" kern="1200">
+        <a:solidFill>
+          <a:schemeClr val="tx1"/>
+        </a:solidFill>
+        <a:latin typeface="+mn-lt"/>
+        <a:ea typeface="+mn-ea"/>
+        <a:cs typeface="+mn-cs"/>
+      </a:defRPr>
+    </a:lvl8pPr>
+    <a:lvl9pPr marL="3657600" algn="l" defTabSz="914400" rtl="0" eaLnBrk="1" latinLnBrk="0" hangingPunct="1">
+      <a:defRPr sz="1200" kern="1200">
+        <a:solidFill>
+          <a:schemeClr val="tx1"/>
+        </a:solidFill>
+        <a:latin typeface="+mn-lt"/>
+        <a:ea typeface="+mn-ea"/>
+        <a:cs typeface="+mn-cs"/>
+      </a:defRPr>
+    </a:lvl9pPr>
+  </p:notesStyle>
+</p:notesMaster>
+</file>
+
+<file path=ppt/notesSlides/notesSlide1.xml><?xml version="1.0" encoding="utf-8"?>
+<p:notes xmlns:a="http://schemas.openxmlformats.org/drawingml/2006/main" xmlns:r="http://schemas.openxmlformats.org/officeDocument/2006/relationships" xmlns:p="http://schemas.openxmlformats.org/presentationml/2006/main">
+  <p:cSld>
+    <p:spTree>
+      <p:nvGrpSpPr>
+        <p:cNvPr id="1" name=""/>
+        <p:cNvGrpSpPr/>
+        <p:nvPr/>
+      </p:nvGrpSpPr>
+      <p:grpSpPr>
+        <a:xfrm>
+          <a:off x="0" y="0"/>
+          <a:ext cx="0" cy="0"/>
+          <a:chOff x="0" y="0"/>
+          <a:chExt cx="0" cy="0"/>
+        </a:xfrm>
+      </p:grpSpPr>
+      <p:sp>
+        <p:nvSpPr>
+          <p:cNvPr id="2" name="Slide Image Placeholder 1"/>
+          <p:cNvSpPr>
+            <a:spLocks noGrp="1" noRot="1" noChangeAspect="1"/>
+          </p:cNvSpPr>
+          <p:nvPr>
+            <p:ph type="sldImg"/>
+          </p:nvPr>
+        </p:nvSpPr>
+        <p:spPr/>
+      </p:sp>
+      <p:sp>
+        <p:nvSpPr>
+          <p:cNvPr id="3" name="Notes Placeholder 2"/>
+          <p:cNvSpPr>
+            <a:spLocks noGrp="1"/>
+          </p:cNvSpPr>
+          <p:nvPr>
+            <p:ph type="body" idx="1"/>
+          </p:nvPr>
+        </p:nvSpPr>
+        <p:spPr/>
+        <p:txBody>
+          <a:bodyPr/>
+          <a:lstStyle/>
+          <a:p>
+            <a:r>
+              <a:rPr lang="en-US" dirty="0"/>
+              <a:t>Tyler</a:t>
+            </a:r>
+          </a:p>
+        </p:txBody>
+      </p:sp>
+      <p:sp>
+        <p:nvSpPr>
+          <p:cNvPr id="4" name="Slide Number Placeholder 3"/>
+          <p:cNvSpPr>
+            <a:spLocks noGrp="1"/>
+          </p:cNvSpPr>
+          <p:nvPr>
+            <p:ph type="sldNum" sz="quarter" idx="5"/>
+          </p:nvPr>
+        </p:nvSpPr>
+        <p:spPr/>
+        <p:txBody>
+          <a:bodyPr/>
+          <a:lstStyle/>
+          <a:p>
+            <a:fld id="{0B1519F3-A86B-48DF-8F7A-0713D35571C6}" type="slidenum">
+              <a:rPr lang="en-US" smtClean="0"/>
+              <a:t>1</a:t>
+            </a:fld>
+            <a:endParaRPr lang="en-US"/>
+          </a:p>
+        </p:txBody>
+      </p:sp>
+    </p:spTree>
+    <p:extLst>
+      <p:ext uri="{BB962C8B-B14F-4D97-AF65-F5344CB8AC3E}">
+        <p14:creationId xmlns:p14="http://schemas.microsoft.com/office/powerpoint/2010/main" val="3106022889"/>
+      </p:ext>
+    </p:extLst>
+  </p:cSld>
+  <p:clrMapOvr>
+    <a:masterClrMapping/>
+  </p:clrMapOvr>
+</p:notes>
+</file>
+
+<file path=ppt/notesSlides/notesSlide10.xml><?xml version="1.0" encoding="utf-8"?>
+<p:notes xmlns:a="http://schemas.openxmlformats.org/drawingml/2006/main" xmlns:r="http://schemas.openxmlformats.org/officeDocument/2006/relationships" xmlns:p="http://schemas.openxmlformats.org/presentationml/2006/main">
+  <p:cSld>
+    <p:spTree>
+      <p:nvGrpSpPr>
+        <p:cNvPr id="1" name=""/>
+        <p:cNvGrpSpPr/>
+        <p:nvPr/>
+      </p:nvGrpSpPr>
+      <p:grpSpPr>
+        <a:xfrm>
+          <a:off x="0" y="0"/>
+          <a:ext cx="0" cy="0"/>
+          <a:chOff x="0" y="0"/>
+          <a:chExt cx="0" cy="0"/>
+        </a:xfrm>
+      </p:grpSpPr>
+      <p:sp>
+        <p:nvSpPr>
+          <p:cNvPr id="2" name="Slide Image Placeholder 1"/>
+          <p:cNvSpPr>
+            <a:spLocks noGrp="1" noRot="1" noChangeAspect="1"/>
+          </p:cNvSpPr>
+          <p:nvPr>
+            <p:ph type="sldImg"/>
+          </p:nvPr>
+        </p:nvSpPr>
+        <p:spPr/>
+      </p:sp>
+      <p:sp>
+        <p:nvSpPr>
+          <p:cNvPr id="3" name="Notes Placeholder 2"/>
+          <p:cNvSpPr>
+            <a:spLocks noGrp="1"/>
+          </p:cNvSpPr>
+          <p:nvPr>
+            <p:ph type="body" idx="1"/>
+          </p:nvPr>
+        </p:nvSpPr>
+        <p:spPr/>
+        <p:txBody>
+          <a:bodyPr/>
+          <a:lstStyle/>
+          <a:p>
+            <a:r>
+              <a:rPr lang="en-US" dirty="0"/>
+              <a:t>Mai</a:t>
+            </a:r>
+          </a:p>
+        </p:txBody>
+      </p:sp>
+      <p:sp>
+        <p:nvSpPr>
+          <p:cNvPr id="4" name="Slide Number Placeholder 3"/>
+          <p:cNvSpPr>
+            <a:spLocks noGrp="1"/>
+          </p:cNvSpPr>
+          <p:nvPr>
+            <p:ph type="sldNum" sz="quarter" idx="5"/>
+          </p:nvPr>
+        </p:nvSpPr>
+        <p:spPr/>
+        <p:txBody>
+          <a:bodyPr/>
+          <a:lstStyle/>
+          <a:p>
+            <a:fld id="{0B1519F3-A86B-48DF-8F7A-0713D35571C6}" type="slidenum">
+              <a:rPr lang="en-US" smtClean="0"/>
+              <a:t>10</a:t>
+            </a:fld>
+            <a:endParaRPr lang="en-US"/>
+          </a:p>
+        </p:txBody>
+      </p:sp>
+    </p:spTree>
+    <p:extLst>
+      <p:ext uri="{BB962C8B-B14F-4D97-AF65-F5344CB8AC3E}">
+        <p14:creationId xmlns:p14="http://schemas.microsoft.com/office/powerpoint/2010/main" val="1047847942"/>
+      </p:ext>
+    </p:extLst>
+  </p:cSld>
+  <p:clrMapOvr>
+    <a:masterClrMapping/>
+  </p:clrMapOvr>
+</p:notes>
+</file>
+
+<file path=ppt/notesSlides/notesSlide11.xml><?xml version="1.0" encoding="utf-8"?>
+<p:notes xmlns:a="http://schemas.openxmlformats.org/drawingml/2006/main" xmlns:r="http://schemas.openxmlformats.org/officeDocument/2006/relationships" xmlns:p="http://schemas.openxmlformats.org/presentationml/2006/main">
+  <p:cSld>
+    <p:spTree>
+      <p:nvGrpSpPr>
+        <p:cNvPr id="1" name=""/>
+        <p:cNvGrpSpPr/>
+        <p:nvPr/>
+      </p:nvGrpSpPr>
+      <p:grpSpPr>
+        <a:xfrm>
+          <a:off x="0" y="0"/>
+          <a:ext cx="0" cy="0"/>
+          <a:chOff x="0" y="0"/>
+          <a:chExt cx="0" cy="0"/>
+        </a:xfrm>
+      </p:grpSpPr>
+      <p:sp>
+        <p:nvSpPr>
+          <p:cNvPr id="2" name="Slide Image Placeholder 1"/>
+          <p:cNvSpPr>
+            <a:spLocks noGrp="1" noRot="1" noChangeAspect="1"/>
+          </p:cNvSpPr>
+          <p:nvPr>
+            <p:ph type="sldImg"/>
+          </p:nvPr>
+        </p:nvSpPr>
+        <p:spPr/>
+      </p:sp>
+      <p:sp>
+        <p:nvSpPr>
+          <p:cNvPr id="3" name="Notes Placeholder 2"/>
+          <p:cNvSpPr>
+            <a:spLocks noGrp="1"/>
+          </p:cNvSpPr>
+          <p:nvPr>
+            <p:ph type="body" idx="1"/>
+          </p:nvPr>
+        </p:nvSpPr>
+        <p:spPr/>
+        <p:txBody>
+          <a:bodyPr/>
+          <a:lstStyle/>
+          <a:p>
+            <a:r>
+              <a:rPr lang="en-US" dirty="0"/>
+              <a:t>Cindy</a:t>
+            </a:r>
+          </a:p>
+        </p:txBody>
+      </p:sp>
+      <p:sp>
+        <p:nvSpPr>
+          <p:cNvPr id="4" name="Slide Number Placeholder 3"/>
+          <p:cNvSpPr>
+            <a:spLocks noGrp="1"/>
+          </p:cNvSpPr>
+          <p:nvPr>
+            <p:ph type="sldNum" sz="quarter" idx="5"/>
+          </p:nvPr>
+        </p:nvSpPr>
+        <p:spPr/>
+        <p:txBody>
+          <a:bodyPr/>
+          <a:lstStyle/>
+          <a:p>
+            <a:fld id="{0B1519F3-A86B-48DF-8F7A-0713D35571C6}" type="slidenum">
+              <a:rPr lang="en-US" smtClean="0"/>
+              <a:t>11</a:t>
+            </a:fld>
+            <a:endParaRPr lang="en-US"/>
+          </a:p>
+        </p:txBody>
+      </p:sp>
+    </p:spTree>
+    <p:extLst>
+      <p:ext uri="{BB962C8B-B14F-4D97-AF65-F5344CB8AC3E}">
+        <p14:creationId xmlns:p14="http://schemas.microsoft.com/office/powerpoint/2010/main" val="2227298309"/>
+      </p:ext>
+    </p:extLst>
+  </p:cSld>
+  <p:clrMapOvr>
+    <a:masterClrMapping/>
+  </p:clrMapOvr>
+</p:notes>
+</file>
+
+<file path=ppt/notesSlides/notesSlide12.xml><?xml version="1.0" encoding="utf-8"?>
+<p:notes xmlns:a="http://schemas.openxmlformats.org/drawingml/2006/main" xmlns:r="http://schemas.openxmlformats.org/officeDocument/2006/relationships" xmlns:p="http://schemas.openxmlformats.org/presentationml/2006/main">
+  <p:cSld>
+    <p:spTree>
+      <p:nvGrpSpPr>
+        <p:cNvPr id="1" name=""/>
+        <p:cNvGrpSpPr/>
+        <p:nvPr/>
+      </p:nvGrpSpPr>
+      <p:grpSpPr>
+        <a:xfrm>
+          <a:off x="0" y="0"/>
+          <a:ext cx="0" cy="0"/>
+          <a:chOff x="0" y="0"/>
+          <a:chExt cx="0" cy="0"/>
+        </a:xfrm>
+      </p:grpSpPr>
+      <p:sp>
+        <p:nvSpPr>
+          <p:cNvPr id="2" name="Slide Image Placeholder 1"/>
+          <p:cNvSpPr>
+            <a:spLocks noGrp="1" noRot="1" noChangeAspect="1"/>
+          </p:cNvSpPr>
+          <p:nvPr>
+            <p:ph type="sldImg"/>
+          </p:nvPr>
+        </p:nvSpPr>
+        <p:spPr/>
+      </p:sp>
+      <p:sp>
+        <p:nvSpPr>
+          <p:cNvPr id="3" name="Notes Placeholder 2"/>
+          <p:cNvSpPr>
+            <a:spLocks noGrp="1"/>
+          </p:cNvSpPr>
+          <p:nvPr>
+            <p:ph type="body" idx="1"/>
+          </p:nvPr>
+        </p:nvSpPr>
+        <p:spPr/>
+        <p:txBody>
+          <a:bodyPr/>
+          <a:lstStyle/>
+          <a:p>
+            <a:r>
+              <a:rPr lang="en-US" dirty="0"/>
+              <a:t>Tyler</a:t>
+            </a:r>
+          </a:p>
+        </p:txBody>
+      </p:sp>
+      <p:sp>
+        <p:nvSpPr>
+          <p:cNvPr id="4" name="Slide Number Placeholder 3"/>
+          <p:cNvSpPr>
+            <a:spLocks noGrp="1"/>
+          </p:cNvSpPr>
+          <p:nvPr>
+            <p:ph type="sldNum" sz="quarter" idx="5"/>
+          </p:nvPr>
+        </p:nvSpPr>
+        <p:spPr/>
+        <p:txBody>
+          <a:bodyPr/>
+          <a:lstStyle/>
+          <a:p>
+            <a:fld id="{0B1519F3-A86B-48DF-8F7A-0713D35571C6}" type="slidenum">
+              <a:rPr lang="en-US" smtClean="0"/>
+              <a:t>12</a:t>
+            </a:fld>
+            <a:endParaRPr lang="en-US"/>
+          </a:p>
+        </p:txBody>
+      </p:sp>
+    </p:spTree>
+    <p:extLst>
+      <p:ext uri="{BB962C8B-B14F-4D97-AF65-F5344CB8AC3E}">
+        <p14:creationId xmlns:p14="http://schemas.microsoft.com/office/powerpoint/2010/main" val="3168662053"/>
+      </p:ext>
+    </p:extLst>
+  </p:cSld>
+  <p:clrMapOvr>
+    <a:masterClrMapping/>
+  </p:clrMapOvr>
+</p:notes>
+</file>
+
+<file path=ppt/notesSlides/notesSlide2.xml><?xml version="1.0" encoding="utf-8"?>
+<p:notes xmlns:a="http://schemas.openxmlformats.org/drawingml/2006/main" xmlns:r="http://schemas.openxmlformats.org/officeDocument/2006/relationships" xmlns:p="http://schemas.openxmlformats.org/presentationml/2006/main">
+  <p:cSld>
+    <p:spTree>
+      <p:nvGrpSpPr>
+        <p:cNvPr id="1" name=""/>
+        <p:cNvGrpSpPr/>
+        <p:nvPr/>
+      </p:nvGrpSpPr>
+      <p:grpSpPr>
+        <a:xfrm>
+          <a:off x="0" y="0"/>
+          <a:ext cx="0" cy="0"/>
+          <a:chOff x="0" y="0"/>
+          <a:chExt cx="0" cy="0"/>
+        </a:xfrm>
+      </p:grpSpPr>
+      <p:sp>
+        <p:nvSpPr>
+          <p:cNvPr id="2" name="Slide Image Placeholder 1"/>
+          <p:cNvSpPr>
+            <a:spLocks noGrp="1" noRot="1" noChangeAspect="1"/>
+          </p:cNvSpPr>
+          <p:nvPr>
+            <p:ph type="sldImg"/>
+          </p:nvPr>
+        </p:nvSpPr>
+        <p:spPr/>
+      </p:sp>
+      <p:sp>
+        <p:nvSpPr>
+          <p:cNvPr id="3" name="Notes Placeholder 2"/>
+          <p:cNvSpPr>
+            <a:spLocks noGrp="1"/>
+          </p:cNvSpPr>
+          <p:nvPr>
+            <p:ph type="body" idx="1"/>
+          </p:nvPr>
+        </p:nvSpPr>
+        <p:spPr/>
+        <p:txBody>
+          <a:bodyPr/>
+          <a:lstStyle/>
+          <a:p>
+            <a:r>
+              <a:rPr lang="en-US" dirty="0"/>
+              <a:t>Tyler</a:t>
+            </a:r>
+          </a:p>
+        </p:txBody>
+      </p:sp>
+      <p:sp>
+        <p:nvSpPr>
+          <p:cNvPr id="4" name="Slide Number Placeholder 3"/>
+          <p:cNvSpPr>
+            <a:spLocks noGrp="1"/>
+          </p:cNvSpPr>
+          <p:nvPr>
+            <p:ph type="sldNum" sz="quarter" idx="5"/>
+          </p:nvPr>
+        </p:nvSpPr>
+        <p:spPr/>
+        <p:txBody>
+          <a:bodyPr/>
+          <a:lstStyle/>
+          <a:p>
+            <a:fld id="{0B1519F3-A86B-48DF-8F7A-0713D35571C6}" type="slidenum">
+              <a:rPr lang="en-US" smtClean="0"/>
+              <a:t>2</a:t>
+            </a:fld>
+            <a:endParaRPr lang="en-US"/>
+          </a:p>
+        </p:txBody>
+      </p:sp>
+    </p:spTree>
+    <p:extLst>
+      <p:ext uri="{BB962C8B-B14F-4D97-AF65-F5344CB8AC3E}">
+        <p14:creationId xmlns:p14="http://schemas.microsoft.com/office/powerpoint/2010/main" val="1580440321"/>
+      </p:ext>
+    </p:extLst>
+  </p:cSld>
+  <p:clrMapOvr>
+    <a:masterClrMapping/>
+  </p:clrMapOvr>
+</p:notes>
+</file>
+
+<file path=ppt/notesSlides/notesSlide3.xml><?xml version="1.0" encoding="utf-8"?>
+<p:notes xmlns:a="http://schemas.openxmlformats.org/drawingml/2006/main" xmlns:r="http://schemas.openxmlformats.org/officeDocument/2006/relationships" xmlns:p="http://schemas.openxmlformats.org/presentationml/2006/main">
+  <p:cSld>
+    <p:spTree>
+      <p:nvGrpSpPr>
+        <p:cNvPr id="1" name=""/>
+        <p:cNvGrpSpPr/>
+        <p:nvPr/>
+      </p:nvGrpSpPr>
+      <p:grpSpPr>
+        <a:xfrm>
+          <a:off x="0" y="0"/>
+          <a:ext cx="0" cy="0"/>
+          <a:chOff x="0" y="0"/>
+          <a:chExt cx="0" cy="0"/>
+        </a:xfrm>
+      </p:grpSpPr>
+      <p:sp>
+        <p:nvSpPr>
+          <p:cNvPr id="2" name="Slide Image Placeholder 1"/>
+          <p:cNvSpPr>
+            <a:spLocks noGrp="1" noRot="1" noChangeAspect="1"/>
+          </p:cNvSpPr>
+          <p:nvPr>
+            <p:ph type="sldImg"/>
+          </p:nvPr>
+        </p:nvSpPr>
+        <p:spPr/>
+      </p:sp>
+      <p:sp>
+        <p:nvSpPr>
+          <p:cNvPr id="3" name="Notes Placeholder 2"/>
+          <p:cNvSpPr>
+            <a:spLocks noGrp="1"/>
+          </p:cNvSpPr>
+          <p:nvPr>
+            <p:ph type="body" idx="1"/>
+          </p:nvPr>
+        </p:nvSpPr>
+        <p:spPr/>
+        <p:txBody>
+          <a:bodyPr/>
+          <a:lstStyle/>
+          <a:p>
+            <a:r>
+              <a:rPr lang="en-US" dirty="0"/>
+              <a:t>Tyler</a:t>
+            </a:r>
+          </a:p>
+        </p:txBody>
+      </p:sp>
+      <p:sp>
+        <p:nvSpPr>
+          <p:cNvPr id="4" name="Slide Number Placeholder 3"/>
+          <p:cNvSpPr>
+            <a:spLocks noGrp="1"/>
+          </p:cNvSpPr>
+          <p:nvPr>
+            <p:ph type="sldNum" sz="quarter" idx="5"/>
+          </p:nvPr>
+        </p:nvSpPr>
+        <p:spPr/>
+        <p:txBody>
+          <a:bodyPr/>
+          <a:lstStyle/>
+          <a:p>
+            <a:fld id="{0B1519F3-A86B-48DF-8F7A-0713D35571C6}" type="slidenum">
+              <a:rPr lang="en-US" smtClean="0"/>
+              <a:t>3</a:t>
+            </a:fld>
+            <a:endParaRPr lang="en-US"/>
+          </a:p>
+        </p:txBody>
+      </p:sp>
+    </p:spTree>
+    <p:extLst>
+      <p:ext uri="{BB962C8B-B14F-4D97-AF65-F5344CB8AC3E}">
+        <p14:creationId xmlns:p14="http://schemas.microsoft.com/office/powerpoint/2010/main" val="2506621357"/>
+      </p:ext>
+    </p:extLst>
+  </p:cSld>
+  <p:clrMapOvr>
+    <a:masterClrMapping/>
+  </p:clrMapOvr>
+</p:notes>
+</file>
+
+<file path=ppt/notesSlides/notesSlide4.xml><?xml version="1.0" encoding="utf-8"?>
+<p:notes xmlns:a="http://schemas.openxmlformats.org/drawingml/2006/main" xmlns:r="http://schemas.openxmlformats.org/officeDocument/2006/relationships" xmlns:p="http://schemas.openxmlformats.org/presentationml/2006/main">
+  <p:cSld>
+    <p:spTree>
+      <p:nvGrpSpPr>
+        <p:cNvPr id="1" name=""/>
+        <p:cNvGrpSpPr/>
+        <p:nvPr/>
+      </p:nvGrpSpPr>
+      <p:grpSpPr>
+        <a:xfrm>
+          <a:off x="0" y="0"/>
+          <a:ext cx="0" cy="0"/>
+          <a:chOff x="0" y="0"/>
+          <a:chExt cx="0" cy="0"/>
+        </a:xfrm>
+      </p:grpSpPr>
+      <p:sp>
+        <p:nvSpPr>
+          <p:cNvPr id="2" name="Slide Image Placeholder 1"/>
+          <p:cNvSpPr>
+            <a:spLocks noGrp="1" noRot="1" noChangeAspect="1"/>
+          </p:cNvSpPr>
+          <p:nvPr>
+            <p:ph type="sldImg"/>
+          </p:nvPr>
+        </p:nvSpPr>
+        <p:spPr/>
+      </p:sp>
+      <p:sp>
+        <p:nvSpPr>
+          <p:cNvPr id="3" name="Notes Placeholder 2"/>
+          <p:cNvSpPr>
+            <a:spLocks noGrp="1"/>
+          </p:cNvSpPr>
+          <p:nvPr>
+            <p:ph type="body" idx="1"/>
+          </p:nvPr>
+        </p:nvSpPr>
+        <p:spPr/>
+        <p:txBody>
+          <a:bodyPr/>
+          <a:lstStyle/>
+          <a:p>
+            <a:r>
+              <a:rPr lang="en-US" dirty="0"/>
+              <a:t>Cindy</a:t>
+            </a:r>
+          </a:p>
+        </p:txBody>
+      </p:sp>
+      <p:sp>
+        <p:nvSpPr>
+          <p:cNvPr id="4" name="Slide Number Placeholder 3"/>
+          <p:cNvSpPr>
+            <a:spLocks noGrp="1"/>
+          </p:cNvSpPr>
+          <p:nvPr>
+            <p:ph type="sldNum" sz="quarter" idx="5"/>
+          </p:nvPr>
+        </p:nvSpPr>
+        <p:spPr/>
+        <p:txBody>
+          <a:bodyPr/>
+          <a:lstStyle/>
+          <a:p>
+            <a:fld id="{0B1519F3-A86B-48DF-8F7A-0713D35571C6}" type="slidenum">
+              <a:rPr lang="en-US" smtClean="0"/>
+              <a:t>4</a:t>
+            </a:fld>
+            <a:endParaRPr lang="en-US"/>
+          </a:p>
+        </p:txBody>
+      </p:sp>
+    </p:spTree>
+    <p:extLst>
+      <p:ext uri="{BB962C8B-B14F-4D97-AF65-F5344CB8AC3E}">
+        <p14:creationId xmlns:p14="http://schemas.microsoft.com/office/powerpoint/2010/main" val="500645278"/>
+      </p:ext>
+    </p:extLst>
+  </p:cSld>
+  <p:clrMapOvr>
+    <a:masterClrMapping/>
+  </p:clrMapOvr>
+</p:notes>
+</file>
+
+<file path=ppt/notesSlides/notesSlide5.xml><?xml version="1.0" encoding="utf-8"?>
+<p:notes xmlns:a="http://schemas.openxmlformats.org/drawingml/2006/main" xmlns:r="http://schemas.openxmlformats.org/officeDocument/2006/relationships" xmlns:p="http://schemas.openxmlformats.org/presentationml/2006/main">
+  <p:cSld>
+    <p:spTree>
+      <p:nvGrpSpPr>
+        <p:cNvPr id="1" name=""/>
+        <p:cNvGrpSpPr/>
+        <p:nvPr/>
+      </p:nvGrpSpPr>
+      <p:grpSpPr>
+        <a:xfrm>
+          <a:off x="0" y="0"/>
+          <a:ext cx="0" cy="0"/>
+          <a:chOff x="0" y="0"/>
+          <a:chExt cx="0" cy="0"/>
+        </a:xfrm>
+      </p:grpSpPr>
+      <p:sp>
+        <p:nvSpPr>
+          <p:cNvPr id="2" name="Slide Image Placeholder 1"/>
+          <p:cNvSpPr>
+            <a:spLocks noGrp="1" noRot="1" noChangeAspect="1"/>
+          </p:cNvSpPr>
+          <p:nvPr>
+            <p:ph type="sldImg"/>
+          </p:nvPr>
+        </p:nvSpPr>
+        <p:spPr/>
+      </p:sp>
+      <p:sp>
+        <p:nvSpPr>
+          <p:cNvPr id="3" name="Notes Placeholder 2"/>
+          <p:cNvSpPr>
+            <a:spLocks noGrp="1"/>
+          </p:cNvSpPr>
+          <p:nvPr>
+            <p:ph type="body" idx="1"/>
+          </p:nvPr>
+        </p:nvSpPr>
+        <p:spPr/>
+        <p:txBody>
+          <a:bodyPr/>
+          <a:lstStyle/>
+          <a:p>
+            <a:r>
+              <a:rPr lang="en-US" dirty="0"/>
+              <a:t>Cindy</a:t>
+            </a:r>
+          </a:p>
+        </p:txBody>
+      </p:sp>
+      <p:sp>
+        <p:nvSpPr>
+          <p:cNvPr id="4" name="Slide Number Placeholder 3"/>
+          <p:cNvSpPr>
+            <a:spLocks noGrp="1"/>
+          </p:cNvSpPr>
+          <p:nvPr>
+            <p:ph type="sldNum" sz="quarter" idx="5"/>
+          </p:nvPr>
+        </p:nvSpPr>
+        <p:spPr/>
+        <p:txBody>
+          <a:bodyPr/>
+          <a:lstStyle/>
+          <a:p>
+            <a:fld id="{0B1519F3-A86B-48DF-8F7A-0713D35571C6}" type="slidenum">
+              <a:rPr lang="en-US" smtClean="0"/>
+              <a:t>5</a:t>
+            </a:fld>
+            <a:endParaRPr lang="en-US"/>
+          </a:p>
+        </p:txBody>
+      </p:sp>
+    </p:spTree>
+    <p:extLst>
+      <p:ext uri="{BB962C8B-B14F-4D97-AF65-F5344CB8AC3E}">
+        <p14:creationId xmlns:p14="http://schemas.microsoft.com/office/powerpoint/2010/main" val="1134945753"/>
+      </p:ext>
+    </p:extLst>
+  </p:cSld>
+  <p:clrMapOvr>
+    <a:masterClrMapping/>
+  </p:clrMapOvr>
+</p:notes>
+</file>
+
+<file path=ppt/notesSlides/notesSlide6.xml><?xml version="1.0" encoding="utf-8"?>
+<p:notes xmlns:a="http://schemas.openxmlformats.org/drawingml/2006/main" xmlns:r="http://schemas.openxmlformats.org/officeDocument/2006/relationships" xmlns:p="http://schemas.openxmlformats.org/presentationml/2006/main">
+  <p:cSld>
+    <p:spTree>
+      <p:nvGrpSpPr>
+        <p:cNvPr id="1" name=""/>
+        <p:cNvGrpSpPr/>
+        <p:nvPr/>
+      </p:nvGrpSpPr>
+      <p:grpSpPr>
+        <a:xfrm>
+          <a:off x="0" y="0"/>
+          <a:ext cx="0" cy="0"/>
+          <a:chOff x="0" y="0"/>
+          <a:chExt cx="0" cy="0"/>
+        </a:xfrm>
+      </p:grpSpPr>
+      <p:sp>
+        <p:nvSpPr>
+          <p:cNvPr id="2" name="Slide Image Placeholder 1"/>
+          <p:cNvSpPr>
+            <a:spLocks noGrp="1" noRot="1" noChangeAspect="1"/>
+          </p:cNvSpPr>
+          <p:nvPr>
+            <p:ph type="sldImg"/>
+          </p:nvPr>
+        </p:nvSpPr>
+        <p:spPr/>
+      </p:sp>
+      <p:sp>
+        <p:nvSpPr>
+          <p:cNvPr id="3" name="Notes Placeholder 2"/>
+          <p:cNvSpPr>
+            <a:spLocks noGrp="1"/>
+          </p:cNvSpPr>
+          <p:nvPr>
+            <p:ph type="body" idx="1"/>
+          </p:nvPr>
+        </p:nvSpPr>
+        <p:spPr/>
+        <p:txBody>
+          <a:bodyPr/>
+          <a:lstStyle/>
+          <a:p>
+            <a:r>
+              <a:rPr lang="en-US" dirty="0"/>
+              <a:t>Mai</a:t>
+            </a:r>
+          </a:p>
+        </p:txBody>
+      </p:sp>
+      <p:sp>
+        <p:nvSpPr>
+          <p:cNvPr id="4" name="Slide Number Placeholder 3"/>
+          <p:cNvSpPr>
+            <a:spLocks noGrp="1"/>
+          </p:cNvSpPr>
+          <p:nvPr>
+            <p:ph type="sldNum" sz="quarter" idx="5"/>
+          </p:nvPr>
+        </p:nvSpPr>
+        <p:spPr/>
+        <p:txBody>
+          <a:bodyPr/>
+          <a:lstStyle/>
+          <a:p>
+            <a:fld id="{0B1519F3-A86B-48DF-8F7A-0713D35571C6}" type="slidenum">
+              <a:rPr lang="en-US" smtClean="0"/>
+              <a:t>6</a:t>
+            </a:fld>
+            <a:endParaRPr lang="en-US"/>
+          </a:p>
+        </p:txBody>
+      </p:sp>
+    </p:spTree>
+    <p:extLst>
+      <p:ext uri="{BB962C8B-B14F-4D97-AF65-F5344CB8AC3E}">
+        <p14:creationId xmlns:p14="http://schemas.microsoft.com/office/powerpoint/2010/main" val="1778311374"/>
+      </p:ext>
+    </p:extLst>
+  </p:cSld>
+  <p:clrMapOvr>
+    <a:masterClrMapping/>
+  </p:clrMapOvr>
+</p:notes>
+</file>
+
+<file path=ppt/notesSlides/notesSlide7.xml><?xml version="1.0" encoding="utf-8"?>
+<p:notes xmlns:a="http://schemas.openxmlformats.org/drawingml/2006/main" xmlns:r="http://schemas.openxmlformats.org/officeDocument/2006/relationships" xmlns:p="http://schemas.openxmlformats.org/presentationml/2006/main">
+  <p:cSld>
+    <p:spTree>
+      <p:nvGrpSpPr>
+        <p:cNvPr id="1" name=""/>
+        <p:cNvGrpSpPr/>
+        <p:nvPr/>
+      </p:nvGrpSpPr>
+      <p:grpSpPr>
+        <a:xfrm>
+          <a:off x="0" y="0"/>
+          <a:ext cx="0" cy="0"/>
+          <a:chOff x="0" y="0"/>
+          <a:chExt cx="0" cy="0"/>
+        </a:xfrm>
+      </p:grpSpPr>
+      <p:sp>
+        <p:nvSpPr>
+          <p:cNvPr id="2" name="Slide Image Placeholder 1"/>
+          <p:cNvSpPr>
+            <a:spLocks noGrp="1" noRot="1" noChangeAspect="1"/>
+          </p:cNvSpPr>
+          <p:nvPr>
+            <p:ph type="sldImg"/>
+          </p:nvPr>
+        </p:nvSpPr>
+        <p:spPr/>
+      </p:sp>
+      <p:sp>
+        <p:nvSpPr>
+          <p:cNvPr id="3" name="Notes Placeholder 2"/>
+          <p:cNvSpPr>
+            <a:spLocks noGrp="1"/>
+          </p:cNvSpPr>
+          <p:nvPr>
+            <p:ph type="body" idx="1"/>
+          </p:nvPr>
+        </p:nvSpPr>
+        <p:spPr/>
+        <p:txBody>
+          <a:bodyPr/>
+          <a:lstStyle/>
+          <a:p>
+            <a:r>
+              <a:rPr lang="en-US" dirty="0"/>
+              <a:t>Mai</a:t>
+            </a:r>
+          </a:p>
+        </p:txBody>
+      </p:sp>
+      <p:sp>
+        <p:nvSpPr>
+          <p:cNvPr id="4" name="Slide Number Placeholder 3"/>
+          <p:cNvSpPr>
+            <a:spLocks noGrp="1"/>
+          </p:cNvSpPr>
+          <p:nvPr>
+            <p:ph type="sldNum" sz="quarter" idx="5"/>
+          </p:nvPr>
+        </p:nvSpPr>
+        <p:spPr/>
+        <p:txBody>
+          <a:bodyPr/>
+          <a:lstStyle/>
+          <a:p>
+            <a:fld id="{0B1519F3-A86B-48DF-8F7A-0713D35571C6}" type="slidenum">
+              <a:rPr lang="en-US" smtClean="0"/>
+              <a:t>7</a:t>
+            </a:fld>
+            <a:endParaRPr lang="en-US"/>
+          </a:p>
+        </p:txBody>
+      </p:sp>
+    </p:spTree>
+    <p:extLst>
+      <p:ext uri="{BB962C8B-B14F-4D97-AF65-F5344CB8AC3E}">
+        <p14:creationId xmlns:p14="http://schemas.microsoft.com/office/powerpoint/2010/main" val="3724592206"/>
+      </p:ext>
+    </p:extLst>
+  </p:cSld>
+  <p:clrMapOvr>
+    <a:masterClrMapping/>
+  </p:clrMapOvr>
+</p:notes>
+</file>
+
+<file path=ppt/notesSlides/notesSlide8.xml><?xml version="1.0" encoding="utf-8"?>
+<p:notes xmlns:a="http://schemas.openxmlformats.org/drawingml/2006/main" xmlns:r="http://schemas.openxmlformats.org/officeDocument/2006/relationships" xmlns:p="http://schemas.openxmlformats.org/presentationml/2006/main">
+  <p:cSld>
+    <p:spTree>
+      <p:nvGrpSpPr>
+        <p:cNvPr id="1" name=""/>
+        <p:cNvGrpSpPr/>
+        <p:nvPr/>
+      </p:nvGrpSpPr>
+      <p:grpSpPr>
+        <a:xfrm>
+          <a:off x="0" y="0"/>
+          <a:ext cx="0" cy="0"/>
+          <a:chOff x="0" y="0"/>
+          <a:chExt cx="0" cy="0"/>
+        </a:xfrm>
+      </p:grpSpPr>
+      <p:sp>
+        <p:nvSpPr>
+          <p:cNvPr id="2" name="Slide Image Placeholder 1"/>
+          <p:cNvSpPr>
+            <a:spLocks noGrp="1" noRot="1" noChangeAspect="1"/>
+          </p:cNvSpPr>
+          <p:nvPr>
+            <p:ph type="sldImg"/>
+          </p:nvPr>
+        </p:nvSpPr>
+        <p:spPr/>
+      </p:sp>
+      <p:sp>
+        <p:nvSpPr>
+          <p:cNvPr id="3" name="Notes Placeholder 2"/>
+          <p:cNvSpPr>
+            <a:spLocks noGrp="1"/>
+          </p:cNvSpPr>
+          <p:nvPr>
+            <p:ph type="body" idx="1"/>
+          </p:nvPr>
+        </p:nvSpPr>
+        <p:spPr/>
+        <p:txBody>
+          <a:bodyPr/>
+          <a:lstStyle/>
+          <a:p>
+            <a:r>
+              <a:rPr lang="en-US" dirty="0"/>
+              <a:t>Spencer</a:t>
+            </a:r>
+          </a:p>
+        </p:txBody>
+      </p:sp>
+      <p:sp>
+        <p:nvSpPr>
+          <p:cNvPr id="4" name="Slide Number Placeholder 3"/>
+          <p:cNvSpPr>
+            <a:spLocks noGrp="1"/>
+          </p:cNvSpPr>
+          <p:nvPr>
+            <p:ph type="sldNum" sz="quarter" idx="5"/>
+          </p:nvPr>
+        </p:nvSpPr>
+        <p:spPr/>
+        <p:txBody>
+          <a:bodyPr/>
+          <a:lstStyle/>
+          <a:p>
+            <a:fld id="{0B1519F3-A86B-48DF-8F7A-0713D35571C6}" type="slidenum">
+              <a:rPr lang="en-US" smtClean="0"/>
+              <a:t>8</a:t>
+            </a:fld>
+            <a:endParaRPr lang="en-US"/>
+          </a:p>
+        </p:txBody>
+      </p:sp>
+    </p:spTree>
+    <p:extLst>
+      <p:ext uri="{BB962C8B-B14F-4D97-AF65-F5344CB8AC3E}">
+        <p14:creationId xmlns:p14="http://schemas.microsoft.com/office/powerpoint/2010/main" val="3940383513"/>
+      </p:ext>
+    </p:extLst>
+  </p:cSld>
+  <p:clrMapOvr>
+    <a:masterClrMapping/>
+  </p:clrMapOvr>
+</p:notes>
+</file>
+
+<file path=ppt/notesSlides/notesSlide9.xml><?xml version="1.0" encoding="utf-8"?>
+<p:notes xmlns:a="http://schemas.openxmlformats.org/drawingml/2006/main" xmlns:r="http://schemas.openxmlformats.org/officeDocument/2006/relationships" xmlns:p="http://schemas.openxmlformats.org/presentationml/2006/main">
+  <p:cSld>
+    <p:spTree>
+      <p:nvGrpSpPr>
+        <p:cNvPr id="1" name=""/>
+        <p:cNvGrpSpPr/>
+        <p:nvPr/>
+      </p:nvGrpSpPr>
+      <p:grpSpPr>
+        <a:xfrm>
+          <a:off x="0" y="0"/>
+          <a:ext cx="0" cy="0"/>
+          <a:chOff x="0" y="0"/>
+          <a:chExt cx="0" cy="0"/>
+        </a:xfrm>
+      </p:grpSpPr>
+      <p:sp>
+        <p:nvSpPr>
+          <p:cNvPr id="2" name="Slide Image Placeholder 1"/>
+          <p:cNvSpPr>
+            <a:spLocks noGrp="1" noRot="1" noChangeAspect="1"/>
+          </p:cNvSpPr>
+          <p:nvPr>
+            <p:ph type="sldImg"/>
+          </p:nvPr>
+        </p:nvSpPr>
+        <p:spPr/>
+      </p:sp>
+      <p:sp>
+        <p:nvSpPr>
+          <p:cNvPr id="3" name="Notes Placeholder 2"/>
+          <p:cNvSpPr>
+            <a:spLocks noGrp="1"/>
+          </p:cNvSpPr>
+          <p:nvPr>
+            <p:ph type="body" idx="1"/>
+          </p:nvPr>
+        </p:nvSpPr>
+        <p:spPr/>
+        <p:txBody>
+          <a:bodyPr/>
+          <a:lstStyle/>
+          <a:p>
+            <a:r>
+              <a:rPr lang="en-US" dirty="0"/>
+              <a:t>Spencer</a:t>
+            </a:r>
+          </a:p>
+        </p:txBody>
+      </p:sp>
+      <p:sp>
+        <p:nvSpPr>
+          <p:cNvPr id="4" name="Slide Number Placeholder 3"/>
+          <p:cNvSpPr>
+            <a:spLocks noGrp="1"/>
+          </p:cNvSpPr>
+          <p:nvPr>
+            <p:ph type="sldNum" sz="quarter" idx="5"/>
+          </p:nvPr>
+        </p:nvSpPr>
+        <p:spPr/>
+        <p:txBody>
+          <a:bodyPr/>
+          <a:lstStyle/>
+          <a:p>
+            <a:fld id="{0B1519F3-A86B-48DF-8F7A-0713D35571C6}" type="slidenum">
+              <a:rPr lang="en-US" smtClean="0"/>
+              <a:t>9</a:t>
+            </a:fld>
+            <a:endParaRPr lang="en-US"/>
+          </a:p>
+        </p:txBody>
+      </p:sp>
+    </p:spTree>
+    <p:extLst>
+      <p:ext uri="{BB962C8B-B14F-4D97-AF65-F5344CB8AC3E}">
+        <p14:creationId xmlns:p14="http://schemas.microsoft.com/office/powerpoint/2010/main" val="177700641"/>
+      </p:ext>
+    </p:extLst>
+  </p:cSld>
+  <p:clrMapOvr>
+    <a:masterClrMapping/>
+  </p:clrMapOvr>
+</p:notes>
 </file>
 
 <file path=ppt/slideLayouts/slideLayout1.xml><?xml version="1.0" encoding="utf-8"?>
@@ -642,7 +2041,7 @@
           <a:p>
             <a:fld id="{AB160EE0-D7E3-41D8-B189-12969243DCB5}" type="datetimeFigureOut">
               <a:rPr lang="en-US" smtClean="0"/>
-              <a:t>4/29/2024</a:t>
+              <a:t>5/1/2024</a:t>
             </a:fld>
             <a:endParaRPr lang="en-US"/>
           </a:p>
@@ -938,7 +2337,7 @@
           <a:p>
             <a:fld id="{AB160EE0-D7E3-41D8-B189-12969243DCB5}" type="datetimeFigureOut">
               <a:rPr lang="en-US" smtClean="0"/>
-              <a:t>4/29/2024</a:t>
+              <a:t>5/1/2024</a:t>
             </a:fld>
             <a:endParaRPr lang="en-US"/>
           </a:p>
@@ -1186,7 +2585,7 @@
           <a:p>
             <a:fld id="{AB160EE0-D7E3-41D8-B189-12969243DCB5}" type="datetimeFigureOut">
               <a:rPr lang="en-US" smtClean="0"/>
-              <a:t>4/29/2024</a:t>
+              <a:t>5/1/2024</a:t>
             </a:fld>
             <a:endParaRPr lang="en-US"/>
           </a:p>
@@ -1726,7 +3125,7 @@
           <a:p>
             <a:fld id="{AB160EE0-D7E3-41D8-B189-12969243DCB5}" type="datetimeFigureOut">
               <a:rPr lang="en-US" smtClean="0"/>
-              <a:t>4/29/2024</a:t>
+              <a:t>5/1/2024</a:t>
             </a:fld>
             <a:endParaRPr lang="en-US"/>
           </a:p>
@@ -1974,7 +3373,7 @@
           <a:p>
             <a:fld id="{AB160EE0-D7E3-41D8-B189-12969243DCB5}" type="datetimeFigureOut">
               <a:rPr lang="en-US" smtClean="0"/>
-              <a:t>4/29/2024</a:t>
+              <a:t>5/1/2024</a:t>
             </a:fld>
             <a:endParaRPr lang="en-US"/>
           </a:p>
@@ -2506,7 +3905,7 @@
           <a:p>
             <a:fld id="{AB160EE0-D7E3-41D8-B189-12969243DCB5}" type="datetimeFigureOut">
               <a:rPr lang="en-US" smtClean="0"/>
-              <a:t>4/29/2024</a:t>
+              <a:t>5/1/2024</a:t>
             </a:fld>
             <a:endParaRPr lang="en-US"/>
           </a:p>
@@ -2803,7 +4202,7 @@
           <a:p>
             <a:fld id="{AB160EE0-D7E3-41D8-B189-12969243DCB5}" type="datetimeFigureOut">
               <a:rPr lang="en-US" smtClean="0"/>
-              <a:t>4/29/2024</a:t>
+              <a:t>5/1/2024</a:t>
             </a:fld>
             <a:endParaRPr lang="en-US"/>
           </a:p>
@@ -2977,7 +4376,7 @@
           <a:p>
             <a:fld id="{AB160EE0-D7E3-41D8-B189-12969243DCB5}" type="datetimeFigureOut">
               <a:rPr lang="en-US" smtClean="0"/>
-              <a:t>4/29/2024</a:t>
+              <a:t>5/1/2024</a:t>
             </a:fld>
             <a:endParaRPr lang="en-US"/>
           </a:p>
@@ -3157,7 +4556,7 @@
           <a:p>
             <a:fld id="{AB160EE0-D7E3-41D8-B189-12969243DCB5}" type="datetimeFigureOut">
               <a:rPr lang="en-US" smtClean="0"/>
-              <a:t>4/29/2024</a:t>
+              <a:t>5/1/2024</a:t>
             </a:fld>
             <a:endParaRPr lang="en-US"/>
           </a:p>
@@ -3327,7 +4726,7 @@
           <a:p>
             <a:fld id="{AB160EE0-D7E3-41D8-B189-12969243DCB5}" type="datetimeFigureOut">
               <a:rPr lang="en-US" smtClean="0"/>
-              <a:t>4/29/2024</a:t>
+              <a:t>5/1/2024</a:t>
             </a:fld>
             <a:endParaRPr lang="en-US"/>
           </a:p>
@@ -3578,7 +4977,7 @@
           <a:p>
             <a:fld id="{AB160EE0-D7E3-41D8-B189-12969243DCB5}" type="datetimeFigureOut">
               <a:rPr lang="en-US" smtClean="0"/>
-              <a:t>4/29/2024</a:t>
+              <a:t>5/1/2024</a:t>
             </a:fld>
             <a:endParaRPr lang="en-US"/>
           </a:p>
@@ -3875,7 +5274,7 @@
           <a:p>
             <a:fld id="{AB160EE0-D7E3-41D8-B189-12969243DCB5}" type="datetimeFigureOut">
               <a:rPr lang="en-US" smtClean="0"/>
-              <a:t>4/29/2024</a:t>
+              <a:t>5/1/2024</a:t>
             </a:fld>
             <a:endParaRPr lang="en-US"/>
           </a:p>
@@ -4317,7 +5716,7 @@
           <a:p>
             <a:fld id="{AB160EE0-D7E3-41D8-B189-12969243DCB5}" type="datetimeFigureOut">
               <a:rPr lang="en-US" smtClean="0"/>
-              <a:t>4/29/2024</a:t>
+              <a:t>5/1/2024</a:t>
             </a:fld>
             <a:endParaRPr lang="en-US"/>
           </a:p>
@@ -4435,7 +5834,7 @@
           <a:p>
             <a:fld id="{AB160EE0-D7E3-41D8-B189-12969243DCB5}" type="datetimeFigureOut">
               <a:rPr lang="en-US" smtClean="0"/>
-              <a:t>4/29/2024</a:t>
+              <a:t>5/1/2024</a:t>
             </a:fld>
             <a:endParaRPr lang="en-US"/>
           </a:p>
@@ -4530,7 +5929,7 @@
           <a:p>
             <a:fld id="{AB160EE0-D7E3-41D8-B189-12969243DCB5}" type="datetimeFigureOut">
               <a:rPr lang="en-US" smtClean="0"/>
-              <a:t>4/29/2024</a:t>
+              <a:t>5/1/2024</a:t>
             </a:fld>
             <a:endParaRPr lang="en-US"/>
           </a:p>
@@ -4813,7 +6212,7 @@
           <a:p>
             <a:fld id="{AB160EE0-D7E3-41D8-B189-12969243DCB5}" type="datetimeFigureOut">
               <a:rPr lang="en-US" smtClean="0"/>
-              <a:t>4/29/2024</a:t>
+              <a:t>5/1/2024</a:t>
             </a:fld>
             <a:endParaRPr lang="en-US"/>
           </a:p>
@@ -5104,7 +6503,7 @@
           <a:p>
             <a:fld id="{AB160EE0-D7E3-41D8-B189-12969243DCB5}" type="datetimeFigureOut">
               <a:rPr lang="en-US" smtClean="0"/>
-              <a:t>4/29/2024</a:t>
+              <a:t>5/1/2024</a:t>
             </a:fld>
             <a:endParaRPr lang="en-US"/>
           </a:p>
@@ -5634,7 +7033,7 @@
           <a:p>
             <a:fld id="{AB160EE0-D7E3-41D8-B189-12969243DCB5}" type="datetimeFigureOut">
               <a:rPr lang="en-US" smtClean="0"/>
-              <a:t>4/29/2024</a:t>
+              <a:t>5/1/2024</a:t>
             </a:fld>
             <a:endParaRPr lang="en-US"/>
           </a:p>
@@ -6187,7 +7586,10 @@
           <a:lstStyle/>
           <a:p>
             <a:r>
-              <a:rPr lang="en-US" dirty="0"/>
+              <a:rPr lang="en-US" dirty="0">
+                <a:latin typeface="Arial" panose="020B0604020202020204" pitchFamily="34" charset="0"/>
+                <a:cs typeface="Arial" panose="020B0604020202020204" pitchFamily="34" charset="0"/>
+              </a:rPr>
               <a:t>Data Wizards Project #1</a:t>
             </a:r>
           </a:p>
@@ -6209,13 +7611,21 @@
             <p:ph type="subTitle" idx="1"/>
           </p:nvPr>
         </p:nvSpPr>
-        <p:spPr/>
+        <p:spPr>
+          <a:xfrm>
+            <a:off x="3657601" y="3996267"/>
+            <a:ext cx="7845422" cy="1388534"/>
+          </a:xfrm>
+        </p:spPr>
         <p:txBody>
           <a:bodyPr/>
           <a:lstStyle/>
           <a:p>
             <a:r>
-              <a:rPr lang="en-US" dirty="0"/>
+              <a:rPr lang="en-US" dirty="0">
+                <a:latin typeface="Arial" panose="020B0604020202020204" pitchFamily="34" charset="0"/>
+                <a:cs typeface="Arial" panose="020B0604020202020204" pitchFamily="34" charset="0"/>
+              </a:rPr>
               <a:t>By Di Chen, Mai Castellano, Spencer Hutchison &amp; Tyler Kussee</a:t>
             </a:r>
           </a:p>
@@ -6275,7 +7685,10 @@
           <a:lstStyle/>
           <a:p>
             <a:r>
-              <a:rPr lang="en-US" sz="4400" dirty="0"/>
+              <a:rPr lang="en-US" sz="4400" dirty="0">
+                <a:latin typeface="Arial" panose="020B0604020202020204" pitchFamily="34" charset="0"/>
+                <a:cs typeface="Arial" panose="020B0604020202020204" pitchFamily="34" charset="0"/>
+              </a:rPr>
               <a:t>Obstacles &amp; Solutions</a:t>
             </a:r>
           </a:p>
@@ -6305,28 +7718,40 @@
           <a:lstStyle/>
           <a:p>
             <a:r>
-              <a:rPr lang="en-US" sz="3200" dirty="0"/>
+              <a:rPr lang="en-US" sz="3200" dirty="0">
+                <a:latin typeface="Arial" panose="020B0604020202020204" pitchFamily="34" charset="0"/>
+                <a:cs typeface="Arial" panose="020B0604020202020204" pitchFamily="34" charset="0"/>
+              </a:rPr>
               <a:t>Git Collaboration</a:t>
             </a:r>
           </a:p>
           <a:p>
             <a:pPr lvl="1"/>
             <a:r>
-              <a:rPr lang="en-US" sz="2800" dirty="0"/>
+              <a:rPr lang="en-US" sz="2800" dirty="0">
+                <a:latin typeface="Arial" panose="020B0604020202020204" pitchFamily="34" charset="0"/>
+                <a:cs typeface="Arial" panose="020B0604020202020204" pitchFamily="34" charset="0"/>
+              </a:rPr>
               <a:t>Working on the main branch led to overwriting.</a:t>
             </a:r>
           </a:p>
           <a:p>
             <a:pPr lvl="1"/>
             <a:r>
-              <a:rPr lang="en-US" sz="2800" dirty="0"/>
+              <a:rPr lang="en-US" sz="2800" dirty="0">
+                <a:latin typeface="Arial" panose="020B0604020202020204" pitchFamily="34" charset="0"/>
+                <a:cs typeface="Arial" panose="020B0604020202020204" pitchFamily="34" charset="0"/>
+              </a:rPr>
               <a:t>Personal branches led to code merge issues.</a:t>
             </a:r>
           </a:p>
           <a:p>
             <a:pPr lvl="1"/>
             <a:r>
-              <a:rPr lang="en-US" sz="2800" dirty="0"/>
+              <a:rPr lang="en-US" sz="2800" dirty="0">
+                <a:latin typeface="Arial" panose="020B0604020202020204" pitchFamily="34" charset="0"/>
+                <a:cs typeface="Arial" panose="020B0604020202020204" pitchFamily="34" charset="0"/>
+              </a:rPr>
               <a:t>Eventually resolved through experience.</a:t>
             </a:r>
           </a:p>
@@ -6386,7 +7811,10 @@
           <a:lstStyle/>
           <a:p>
             <a:r>
-              <a:rPr lang="en-US" sz="4400" dirty="0"/>
+              <a:rPr lang="en-US" sz="4400" dirty="0">
+                <a:latin typeface="Arial" panose="020B0604020202020204" pitchFamily="34" charset="0"/>
+                <a:cs typeface="Arial" panose="020B0604020202020204" pitchFamily="34" charset="0"/>
+              </a:rPr>
               <a:t>Future Work/Improvements</a:t>
             </a:r>
           </a:p>
@@ -6416,28 +7844,40 @@
           <a:lstStyle/>
           <a:p>
             <a:r>
-              <a:rPr lang="en-US" sz="3200" dirty="0"/>
+              <a:rPr lang="en-US" sz="3200" dirty="0">
+                <a:latin typeface="Arial" panose="020B0604020202020204" pitchFamily="34" charset="0"/>
+                <a:cs typeface="Arial" panose="020B0604020202020204" pitchFamily="34" charset="0"/>
+              </a:rPr>
               <a:t>Categorical Variables are overwhelming</a:t>
             </a:r>
           </a:p>
           <a:p>
             <a:pPr lvl="1"/>
             <a:r>
-              <a:rPr lang="en-US" sz="2800" dirty="0"/>
+              <a:rPr lang="en-US" sz="2800" dirty="0">
+                <a:latin typeface="Arial" panose="020B0604020202020204" pitchFamily="34" charset="0"/>
+                <a:cs typeface="Arial" panose="020B0604020202020204" pitchFamily="34" charset="0"/>
+              </a:rPr>
               <a:t>Slowed down our R code processing.</a:t>
             </a:r>
           </a:p>
           <a:p>
             <a:pPr lvl="1"/>
             <a:r>
-              <a:rPr lang="en-US" sz="2800" dirty="0"/>
+              <a:rPr lang="en-US" sz="2800" dirty="0">
+                <a:latin typeface="Arial" panose="020B0604020202020204" pitchFamily="34" charset="0"/>
+                <a:cs typeface="Arial" panose="020B0604020202020204" pitchFamily="34" charset="0"/>
+              </a:rPr>
               <a:t>Clean up the questions we’re looking at.</a:t>
             </a:r>
           </a:p>
           <a:p>
             <a:pPr lvl="1"/>
             <a:r>
-              <a:rPr lang="en-US" sz="2800" dirty="0"/>
+              <a:rPr lang="en-US" sz="2800" dirty="0">
+                <a:latin typeface="Arial" panose="020B0604020202020204" pitchFamily="34" charset="0"/>
+                <a:cs typeface="Arial" panose="020B0604020202020204" pitchFamily="34" charset="0"/>
+              </a:rPr>
               <a:t>As few categorical variables as possible.</a:t>
             </a:r>
           </a:p>
@@ -6497,7 +7937,10 @@
           <a:lstStyle/>
           <a:p>
             <a:r>
-              <a:rPr lang="en-US" sz="4400" dirty="0"/>
+              <a:rPr lang="en-US" sz="4400" dirty="0">
+                <a:latin typeface="Arial" panose="020B0604020202020204" pitchFamily="34" charset="0"/>
+                <a:cs typeface="Arial" panose="020B0604020202020204" pitchFamily="34" charset="0"/>
+              </a:rPr>
               <a:t>Conclusion</a:t>
             </a:r>
           </a:p>
@@ -6527,22 +7970,34 @@
           <a:lstStyle/>
           <a:p>
             <a:r>
-              <a:rPr lang="en-US" sz="3200" dirty="0"/>
+              <a:rPr lang="en-US" sz="3200" dirty="0">
+                <a:latin typeface="Arial" panose="020B0604020202020204" pitchFamily="34" charset="0"/>
+                <a:cs typeface="Arial" panose="020B0604020202020204" pitchFamily="34" charset="0"/>
+              </a:rPr>
               <a:t>Strong positive correlation between education attainment and income for both males &amp; females.</a:t>
             </a:r>
           </a:p>
           <a:p>
             <a:r>
-              <a:rPr lang="en-US" sz="3200" dirty="0"/>
+              <a:rPr lang="en-US" sz="3200" dirty="0">
+                <a:latin typeface="Arial" panose="020B0604020202020204" pitchFamily="34" charset="0"/>
+                <a:cs typeface="Arial" panose="020B0604020202020204" pitchFamily="34" charset="0"/>
+              </a:rPr>
               <a:t>Education, race and occupations are significant predictors of household incomes.</a:t>
             </a:r>
           </a:p>
           <a:p>
             <a:r>
-              <a:rPr lang="en-US" sz="3200" dirty="0"/>
+              <a:rPr lang="en-US" sz="3200" dirty="0">
+                <a:latin typeface="Arial" panose="020B0604020202020204" pitchFamily="34" charset="0"/>
+                <a:cs typeface="Arial" panose="020B0604020202020204" pitchFamily="34" charset="0"/>
+              </a:rPr>
               <a:t>Valuable insight into how these variables interact and influence occupation and incomes.</a:t>
             </a:r>
-            <a:endParaRPr lang="en-US" sz="2800" dirty="0"/>
+            <a:endParaRPr lang="en-US" sz="2800" dirty="0">
+              <a:latin typeface="Arial" panose="020B0604020202020204" pitchFamily="34" charset="0"/>
+              <a:cs typeface="Arial" panose="020B0604020202020204" pitchFamily="34" charset="0"/>
+            </a:endParaRPr>
           </a:p>
         </p:txBody>
       </p:sp>
@@ -6600,8 +8055,11 @@
           <a:lstStyle/>
           <a:p>
             <a:r>
-              <a:rPr lang="en-US" sz="4400" dirty="0"/>
-              <a:t>Questions of Interest</a:t>
+              <a:rPr lang="en-US" sz="4400" dirty="0">
+                <a:latin typeface="Arial" panose="020B0604020202020204" pitchFamily="34" charset="0"/>
+                <a:cs typeface="Arial" panose="020B0604020202020204" pitchFamily="34" charset="0"/>
+              </a:rPr>
+              <a:t>Explanation Of The Data</a:t>
             </a:r>
           </a:p>
         </p:txBody>
@@ -6628,20 +8086,38 @@
           <a:lstStyle/>
           <a:p>
             <a:r>
-              <a:rPr lang="en-US" dirty="0"/>
-              <a:t>Does higher education mean higher income accounting for sex and age?</a:t>
-            </a:r>
-          </a:p>
-          <a:p>
-            <a:r>
-              <a:rPr lang="en-US" dirty="0"/>
-              <a:t>Can we predict the household income based on education, occupation, and race/ethnicity?</a:t>
-            </a:r>
-          </a:p>
-          <a:p>
-            <a:r>
-              <a:rPr lang="en-US" dirty="0"/>
-              <a:t>Is there a relationship between Occupation, home ownership, race/ethnicity and Marital Status, occupation group, and income?</a:t>
+              <a:rPr lang="en-US" dirty="0">
+                <a:latin typeface="Arial" panose="020B0604020202020204" pitchFamily="34" charset="0"/>
+                <a:cs typeface="Arial" panose="020B0604020202020204" pitchFamily="34" charset="0"/>
+              </a:rPr>
+              <a:t>This data comes from The American Community Survey.</a:t>
+            </a:r>
+          </a:p>
+          <a:p>
+            <a:r>
+              <a:rPr lang="en-US" dirty="0">
+                <a:latin typeface="Arial" panose="020B0604020202020204" pitchFamily="34" charset="0"/>
+                <a:cs typeface="Arial" panose="020B0604020202020204" pitchFamily="34" charset="0"/>
+              </a:rPr>
+              <a:t>Individuals are surveyed on an annual basis to gain information on the citizens across the United States.</a:t>
+            </a:r>
+          </a:p>
+          <a:p>
+            <a:r>
+              <a:rPr lang="en-US" dirty="0">
+                <a:latin typeface="Arial" panose="020B0604020202020204" pitchFamily="34" charset="0"/>
+                <a:cs typeface="Arial" panose="020B0604020202020204" pitchFamily="34" charset="0"/>
+              </a:rPr>
+              <a:t>This dataset is centered around those individuals above the age of 14 and who lived in Oregon in the year 2022.</a:t>
+            </a:r>
+          </a:p>
+          <a:p>
+            <a:r>
+              <a:rPr lang="en-US" dirty="0">
+                <a:latin typeface="Arial" panose="020B0604020202020204" pitchFamily="34" charset="0"/>
+                <a:cs typeface="Arial" panose="020B0604020202020204" pitchFamily="34" charset="0"/>
+              </a:rPr>
+              <a:t>The variables we worked with were age, education level, income, sex, race, home ownership, occupation, marital status and house acreage.</a:t>
             </a:r>
           </a:p>
         </p:txBody>
@@ -6649,7 +8125,7 @@
     </p:spTree>
     <p:extLst>
       <p:ext uri="{BB962C8B-B14F-4D97-AF65-F5344CB8AC3E}">
-        <p14:creationId xmlns:p14="http://schemas.microsoft.com/office/powerpoint/2010/main" val="1252541815"/>
+        <p14:creationId xmlns:p14="http://schemas.microsoft.com/office/powerpoint/2010/main" val="3569469459"/>
       </p:ext>
     </p:extLst>
   </p:cSld>
@@ -6700,8 +8176,11 @@
           <a:lstStyle/>
           <a:p>
             <a:r>
-              <a:rPr lang="en-US" sz="4400" dirty="0"/>
-              <a:t>Explanation Of The Data</a:t>
+              <a:rPr lang="en-US" sz="4400" dirty="0">
+                <a:latin typeface="Arial" panose="020B0604020202020204" pitchFamily="34" charset="0"/>
+                <a:cs typeface="Arial" panose="020B0604020202020204" pitchFamily="34" charset="0"/>
+              </a:rPr>
+              <a:t>Questions of Interest</a:t>
             </a:r>
           </a:p>
         </p:txBody>
@@ -6728,20 +8207,29 @@
           <a:lstStyle/>
           <a:p>
             <a:r>
-              <a:rPr lang="en-US" dirty="0"/>
-              <a:t>This data comes from The American Community Survey.</a:t>
-            </a:r>
-          </a:p>
-          <a:p>
-            <a:r>
-              <a:rPr lang="en-US" dirty="0"/>
-              <a:t>Individuals are surveyed on an annual basis to gain information on the citizens across the United States.</a:t>
-            </a:r>
-          </a:p>
-          <a:p>
-            <a:r>
-              <a:rPr lang="en-US" dirty="0"/>
-              <a:t>This dataset is centered around those individuals above the age of 14 and who lived in Oregon in the year 2022.</a:t>
+              <a:rPr lang="en-US" dirty="0">
+                <a:latin typeface="Arial" panose="020B0604020202020204" pitchFamily="34" charset="0"/>
+                <a:cs typeface="Arial" panose="020B0604020202020204" pitchFamily="34" charset="0"/>
+              </a:rPr>
+              <a:t>Does higher education mean higher income accounting for sex and age?</a:t>
+            </a:r>
+          </a:p>
+          <a:p>
+            <a:r>
+              <a:rPr lang="en-US" dirty="0">
+                <a:latin typeface="Arial" panose="020B0604020202020204" pitchFamily="34" charset="0"/>
+                <a:cs typeface="Arial" panose="020B0604020202020204" pitchFamily="34" charset="0"/>
+              </a:rPr>
+              <a:t>Can we predict the household income based on education, occupation, and race/ethnicity?</a:t>
+            </a:r>
+          </a:p>
+          <a:p>
+            <a:r>
+              <a:rPr lang="en-US" dirty="0">
+                <a:latin typeface="Arial" panose="020B0604020202020204" pitchFamily="34" charset="0"/>
+                <a:cs typeface="Arial" panose="020B0604020202020204" pitchFamily="34" charset="0"/>
+              </a:rPr>
+              <a:t>Is there a relationship between Occupation, home ownership, race/ethnicity and Marital Status, occupation group, and income?</a:t>
             </a:r>
           </a:p>
         </p:txBody>
@@ -6749,7 +8237,7 @@
     </p:spTree>
     <p:extLst>
       <p:ext uri="{BB962C8B-B14F-4D97-AF65-F5344CB8AC3E}">
-        <p14:creationId xmlns:p14="http://schemas.microsoft.com/office/powerpoint/2010/main" val="3569469459"/>
+        <p14:creationId xmlns:p14="http://schemas.microsoft.com/office/powerpoint/2010/main" val="1252541815"/>
       </p:ext>
     </p:extLst>
   </p:cSld>
@@ -6800,11 +8288,17 @@
           <a:lstStyle/>
           <a:p>
             <a:r>
-              <a:rPr lang="en-US" u="sng" dirty="0"/>
+              <a:rPr lang="en-US" u="sng" dirty="0">
+                <a:latin typeface="Arial" panose="020B0604020202020204" pitchFamily="34" charset="0"/>
+                <a:cs typeface="Arial" panose="020B0604020202020204" pitchFamily="34" charset="0"/>
+              </a:rPr>
               <a:t>Question 1: </a:t>
             </a:r>
             <a:r>
-              <a:rPr lang="en-US" dirty="0"/>
+              <a:rPr lang="en-US" dirty="0">
+                <a:latin typeface="Arial" panose="020B0604020202020204" pitchFamily="34" charset="0"/>
+                <a:cs typeface="Arial" panose="020B0604020202020204" pitchFamily="34" charset="0"/>
+              </a:rPr>
               <a:t>Does higher education mean higher income accounting for sex and age?</a:t>
             </a:r>
           </a:p>
@@ -6829,32 +8323,53 @@
         <p:spPr/>
         <p:txBody>
           <a:bodyPr>
-            <a:normAutofit fontScale="92500" lnSpcReduction="20000"/>
+            <a:normAutofit fontScale="70000" lnSpcReduction="20000"/>
           </a:bodyPr>
           <a:lstStyle/>
           <a:p>
             <a:r>
-              <a:rPr lang="en-US" dirty="0"/>
-              <a:t>We considered two models:</a:t>
+              <a:rPr lang="en-US" dirty="0">
+                <a:latin typeface="Arial" panose="020B0604020202020204" pitchFamily="34" charset="0"/>
+                <a:cs typeface="Arial" panose="020B0604020202020204" pitchFamily="34" charset="0"/>
+              </a:rPr>
+              <a:t>Variables: Income as the response variable, Groupings of the education levels, Sex and age interactions.</a:t>
+            </a:r>
+          </a:p>
+          <a:p>
+            <a:r>
+              <a:rPr lang="en-US" dirty="0">
+                <a:latin typeface="Arial" panose="020B0604020202020204" pitchFamily="34" charset="0"/>
+                <a:cs typeface="Arial" panose="020B0604020202020204" pitchFamily="34" charset="0"/>
+              </a:rPr>
+              <a:t>We considered two models after fixing model issues:</a:t>
             </a:r>
           </a:p>
           <a:p>
             <a:pPr lvl="1"/>
             <a:r>
-              <a:rPr lang="en-US" dirty="0"/>
+              <a:rPr lang="en-US" dirty="0">
+                <a:latin typeface="Arial" panose="020B0604020202020204" pitchFamily="34" charset="0"/>
+                <a:cs typeface="Arial" panose="020B0604020202020204" pitchFamily="34" charset="0"/>
+              </a:rPr>
               <a:t>Using the level of education groups, sex and age as explanatory variables.</a:t>
             </a:r>
           </a:p>
           <a:p>
             <a:pPr lvl="1"/>
             <a:r>
-              <a:rPr lang="en-US" dirty="0"/>
+              <a:rPr lang="en-US" dirty="0">
+                <a:latin typeface="Arial" panose="020B0604020202020204" pitchFamily="34" charset="0"/>
+                <a:cs typeface="Arial" panose="020B0604020202020204" pitchFamily="34" charset="0"/>
+              </a:rPr>
               <a:t>Extended the first by incorporating interactions between sex and age.</a:t>
             </a:r>
           </a:p>
           <a:p>
             <a:r>
-              <a:rPr lang="en-US" dirty="0"/>
+              <a:rPr lang="en-US" dirty="0">
+                <a:latin typeface="Arial" panose="020B0604020202020204" pitchFamily="34" charset="0"/>
+                <a:cs typeface="Arial" panose="020B0604020202020204" pitchFamily="34" charset="0"/>
+              </a:rPr>
               <a:t>Employing Ridge regression and 10-fold cross-validation our optimal regression model was: </a:t>
             </a:r>
           </a:p>
@@ -6863,15 +8378,24 @@
               <a:buNone/>
             </a:pPr>
             <a:r>
-              <a:rPr lang="en-US" dirty="0"/>
+              <a:rPr lang="en-US" dirty="0">
+                <a:latin typeface="Arial" panose="020B0604020202020204" pitchFamily="34" charset="0"/>
+                <a:cs typeface="Arial" panose="020B0604020202020204" pitchFamily="34" charset="0"/>
+              </a:rPr>
               <a:t>log(Income) = 9.436 + 0.379(HS, GED, </a:t>
             </a:r>
             <a:r>
-              <a:rPr lang="en-US" dirty="0" err="1"/>
+              <a:rPr lang="en-US" dirty="0" err="1">
+                <a:latin typeface="Arial" panose="020B0604020202020204" pitchFamily="34" charset="0"/>
+                <a:cs typeface="Arial" panose="020B0604020202020204" pitchFamily="34" charset="0"/>
+              </a:rPr>
               <a:t>orAssociatesDegree</a:t>
             </a:r>
             <a:r>
-              <a:rPr lang="en-US" dirty="0"/>
+              <a:rPr lang="en-US" dirty="0">
+                <a:latin typeface="Arial" panose="020B0604020202020204" pitchFamily="34" charset="0"/>
+                <a:cs typeface="Arial" panose="020B0604020202020204" pitchFamily="34" charset="0"/>
+              </a:rPr>
               <a:t>)+</a:t>
             </a:r>
           </a:p>
@@ -6880,23 +8404,38 @@
               <a:buNone/>
             </a:pPr>
             <a:r>
-              <a:rPr lang="en-US" dirty="0"/>
+              <a:rPr lang="en-US" dirty="0">
+                <a:latin typeface="Arial" panose="020B0604020202020204" pitchFamily="34" charset="0"/>
+                <a:cs typeface="Arial" panose="020B0604020202020204" pitchFamily="34" charset="0"/>
+              </a:rPr>
               <a:t>1(</a:t>
             </a:r>
             <a:r>
-              <a:rPr lang="en-US" dirty="0" err="1"/>
+              <a:rPr lang="en-US" dirty="0" err="1">
+                <a:latin typeface="Arial" panose="020B0604020202020204" pitchFamily="34" charset="0"/>
+                <a:cs typeface="Arial" panose="020B0604020202020204" pitchFamily="34" charset="0"/>
+              </a:rPr>
               <a:t>BachelorsDegree</a:t>
             </a:r>
             <a:r>
-              <a:rPr lang="en-US" dirty="0"/>
+              <a:rPr lang="en-US" dirty="0">
+                <a:latin typeface="Arial" panose="020B0604020202020204" pitchFamily="34" charset="0"/>
+                <a:cs typeface="Arial" panose="020B0604020202020204" pitchFamily="34" charset="0"/>
+              </a:rPr>
               <a:t>) + 1.323(M </a:t>
             </a:r>
             <a:r>
-              <a:rPr lang="en-US" dirty="0" err="1"/>
+              <a:rPr lang="en-US" dirty="0" err="1">
+                <a:latin typeface="Arial" panose="020B0604020202020204" pitchFamily="34" charset="0"/>
+                <a:cs typeface="Arial" panose="020B0604020202020204" pitchFamily="34" charset="0"/>
+              </a:rPr>
               <a:t>astersDegreeorhigher</a:t>
             </a:r>
             <a:r>
-              <a:rPr lang="en-US" dirty="0"/>
+              <a:rPr lang="en-US" dirty="0">
+                <a:latin typeface="Arial" panose="020B0604020202020204" pitchFamily="34" charset="0"/>
+                <a:cs typeface="Arial" panose="020B0604020202020204" pitchFamily="34" charset="0"/>
+              </a:rPr>
               <a:t>)+</a:t>
             </a:r>
           </a:p>
@@ -6905,8 +8444,11 @@
               <a:buNone/>
             </a:pPr>
             <a:r>
-              <a:rPr lang="en-US" dirty="0"/>
-              <a:t>0.232(M ale) + 0.002(Age) + 0.003(Male : Age)</a:t>
+              <a:rPr lang="en-US" dirty="0">
+                <a:latin typeface="Arial" panose="020B0604020202020204" pitchFamily="34" charset="0"/>
+                <a:cs typeface="Arial" panose="020B0604020202020204" pitchFamily="34" charset="0"/>
+              </a:rPr>
+              <a:t>0.232(Male) + 0.002(Age) + 0.003(Male : Age)</a:t>
             </a:r>
           </a:p>
         </p:txBody>
@@ -6965,11 +8507,17 @@
           <a:lstStyle/>
           <a:p>
             <a:r>
-              <a:rPr lang="en-US" u="sng" dirty="0"/>
+              <a:rPr lang="en-US" u="sng" dirty="0">
+                <a:latin typeface="Arial" panose="020B0604020202020204" pitchFamily="34" charset="0"/>
+                <a:cs typeface="Arial" panose="020B0604020202020204" pitchFamily="34" charset="0"/>
+              </a:rPr>
               <a:t>Question 1:</a:t>
             </a:r>
             <a:r>
-              <a:rPr lang="en-US" dirty="0"/>
+              <a:rPr lang="en-US" dirty="0">
+                <a:latin typeface="Arial" panose="020B0604020202020204" pitchFamily="34" charset="0"/>
+                <a:cs typeface="Arial" panose="020B0604020202020204" pitchFamily="34" charset="0"/>
+              </a:rPr>
               <a:t> Interpretation</a:t>
             </a:r>
           </a:p>
@@ -6994,24 +8542,33 @@
         <p:spPr/>
         <p:txBody>
           <a:bodyPr>
-            <a:normAutofit fontScale="92500" lnSpcReduction="10000"/>
+            <a:normAutofit fontScale="92500" lnSpcReduction="20000"/>
           </a:bodyPr>
           <a:lstStyle/>
           <a:p>
             <a:r>
-              <a:rPr lang="en-US" dirty="0"/>
+              <a:rPr lang="en-US" dirty="0">
+                <a:latin typeface="Arial" panose="020B0604020202020204" pitchFamily="34" charset="0"/>
+                <a:cs typeface="Arial" panose="020B0604020202020204" pitchFamily="34" charset="0"/>
+              </a:rPr>
               <a:t>For 50-year-old males in Oregon, educational attainment significantly affects median income. Less than high school: $21,273.80. High school, GED, or associate degree: $31,089.90. Bachelor’s degree: $57,829.09. Master’s degree or higher: $79,867.54. </a:t>
             </a:r>
           </a:p>
           <a:p>
             <a:r>
-              <a:rPr lang="en-US" dirty="0"/>
+              <a:rPr lang="en-US" dirty="0">
+                <a:latin typeface="Arial" panose="020B0604020202020204" pitchFamily="34" charset="0"/>
+                <a:cs typeface="Arial" panose="020B0604020202020204" pitchFamily="34" charset="0"/>
+              </a:rPr>
               <a:t>Similarly, for females: less than high school: $14,136.47. High school, GED, or associate degree: $20,659.28. Bachelor’s degree: $38,427.51. Master’s degree or higher: $53,072.1. </a:t>
             </a:r>
           </a:p>
           <a:p>
             <a:r>
-              <a:rPr lang="en-US" dirty="0"/>
+              <a:rPr lang="en-US" dirty="0">
+                <a:latin typeface="Arial" panose="020B0604020202020204" pitchFamily="34" charset="0"/>
+                <a:cs typeface="Arial" panose="020B0604020202020204" pitchFamily="34" charset="0"/>
+              </a:rPr>
               <a:t>These results show a clear positive correlation between education and income for both genders, with significant increases seen at bachelor’s degree level and above.</a:t>
             </a:r>
           </a:p>
@@ -7071,18 +8628,30 @@
           <a:lstStyle/>
           <a:p>
             <a:r>
-              <a:rPr lang="en-US" u="sng" dirty="0"/>
+              <a:rPr lang="en-US" u="sng" dirty="0">
+                <a:latin typeface="Arial" panose="020B0604020202020204" pitchFamily="34" charset="0"/>
+                <a:cs typeface="Arial" panose="020B0604020202020204" pitchFamily="34" charset="0"/>
+              </a:rPr>
               <a:t>Question 2: </a:t>
             </a:r>
             <a:r>
-              <a:rPr lang="en-US" dirty="0"/>
+              <a:rPr lang="en-US" dirty="0">
+                <a:latin typeface="Arial" panose="020B0604020202020204" pitchFamily="34" charset="0"/>
+                <a:cs typeface="Arial" panose="020B0604020202020204" pitchFamily="34" charset="0"/>
+              </a:rPr>
               <a:t>Can we predict the household income based on education, occupation, and race/ethnicity?</a:t>
             </a:r>
             <a:br>
-              <a:rPr lang="en-US" dirty="0"/>
+              <a:rPr lang="en-US" dirty="0">
+                <a:latin typeface="Arial" panose="020B0604020202020204" pitchFamily="34" charset="0"/>
+                <a:cs typeface="Arial" panose="020B0604020202020204" pitchFamily="34" charset="0"/>
+              </a:rPr>
             </a:br>
             <a:r>
-              <a:rPr lang="en-US" dirty="0"/>
+              <a:rPr lang="en-US" dirty="0">
+                <a:latin typeface="Arial" panose="020B0604020202020204" pitchFamily="34" charset="0"/>
+                <a:cs typeface="Arial" panose="020B0604020202020204" pitchFamily="34" charset="0"/>
+              </a:rPr>
               <a:t> </a:t>
             </a:r>
           </a:p>
@@ -7105,7 +8674,7 @@
           </p:nvPr>
         </p:nvPicPr>
         <p:blipFill>
-          <a:blip r:embed="rId2"/>
+          <a:blip r:embed="rId3"/>
           <a:stretch>
             <a:fillRect/>
           </a:stretch>
@@ -7373,13 +8942,19 @@
           </a:lstStyle>
           <a:p>
             <a:r>
-              <a:rPr lang="en-US" dirty="0"/>
+              <a:rPr lang="en-US" dirty="0">
+                <a:latin typeface="Arial" panose="020B0604020202020204" pitchFamily="34" charset="0"/>
+                <a:cs typeface="Arial" panose="020B0604020202020204" pitchFamily="34" charset="0"/>
+              </a:rPr>
               <a:t>Visual insight into Income vs. Race/Ethnicity.</a:t>
             </a:r>
           </a:p>
           <a:p>
             <a:r>
-              <a:rPr lang="en-US" dirty="0"/>
+              <a:rPr lang="en-US" dirty="0">
+                <a:latin typeface="Arial" panose="020B0604020202020204" pitchFamily="34" charset="0"/>
+                <a:cs typeface="Arial" panose="020B0604020202020204" pitchFamily="34" charset="0"/>
+              </a:rPr>
               <a:t>Best subset selection with a test set method and then subsequently using the entirety of the dataset we settled on an 11-variable model, which gave the least mean square error.</a:t>
             </a:r>
           </a:p>
@@ -7439,11 +9014,17 @@
           <a:lstStyle/>
           <a:p>
             <a:r>
-              <a:rPr lang="en-US" u="sng" dirty="0"/>
+              <a:rPr lang="en-US" u="sng" dirty="0">
+                <a:latin typeface="Arial" panose="020B0604020202020204" pitchFamily="34" charset="0"/>
+                <a:cs typeface="Arial" panose="020B0604020202020204" pitchFamily="34" charset="0"/>
+              </a:rPr>
               <a:t>Question 2:</a:t>
             </a:r>
             <a:r>
-              <a:rPr lang="en-US" dirty="0"/>
+              <a:rPr lang="en-US" dirty="0">
+                <a:latin typeface="Arial" panose="020B0604020202020204" pitchFamily="34" charset="0"/>
+                <a:cs typeface="Arial" panose="020B0604020202020204" pitchFamily="34" charset="0"/>
+              </a:rPr>
               <a:t> Interpretation</a:t>
             </a:r>
           </a:p>
@@ -7473,21 +9054,33 @@
           <a:lstStyle/>
           <a:p>
             <a:r>
-              <a:rPr lang="en-US" dirty="0"/>
+              <a:rPr lang="en-US" dirty="0">
+                <a:latin typeface="Arial" panose="020B0604020202020204" pitchFamily="34" charset="0"/>
+                <a:cs typeface="Arial" panose="020B0604020202020204" pitchFamily="34" charset="0"/>
+              </a:rPr>
               <a:t>Our current findings suggest that Education, Race, and </a:t>
             </a:r>
             <a:r>
-              <a:rPr lang="en-US" dirty="0" err="1"/>
+              <a:rPr lang="en-US" dirty="0" err="1">
+                <a:latin typeface="Arial" panose="020B0604020202020204" pitchFamily="34" charset="0"/>
+                <a:cs typeface="Arial" panose="020B0604020202020204" pitchFamily="34" charset="0"/>
+              </a:rPr>
               <a:t>OccupationGroup</a:t>
             </a:r>
             <a:r>
-              <a:rPr lang="en-US" dirty="0"/>
+              <a:rPr lang="en-US" dirty="0">
+                <a:latin typeface="Arial" panose="020B0604020202020204" pitchFamily="34" charset="0"/>
+                <a:cs typeface="Arial" panose="020B0604020202020204" pitchFamily="34" charset="0"/>
+              </a:rPr>
               <a:t> are significant predictors for household income. </a:t>
             </a:r>
           </a:p>
           <a:p>
             <a:r>
-              <a:rPr lang="en-US" dirty="0"/>
+              <a:rPr lang="en-US" dirty="0">
+                <a:latin typeface="Arial" panose="020B0604020202020204" pitchFamily="34" charset="0"/>
+                <a:cs typeface="Arial" panose="020B0604020202020204" pitchFamily="34" charset="0"/>
+              </a:rPr>
               <a:t>These findings shed light on the key factors influencing income levels and could guide future research and policy efforts aimed at reducing income disparities.</a:t>
             </a:r>
           </a:p>
@@ -7552,19 +9145,31 @@
           <a:lstStyle/>
           <a:p>
             <a:r>
-              <a:rPr lang="en-US" sz="3200" u="sng" dirty="0"/>
+              <a:rPr lang="en-US" sz="3200" u="sng" dirty="0">
+                <a:latin typeface="Arial" panose="020B0604020202020204" pitchFamily="34" charset="0"/>
+                <a:cs typeface="Arial" panose="020B0604020202020204" pitchFamily="34" charset="0"/>
+              </a:rPr>
               <a:t>Question 3:</a:t>
             </a:r>
             <a:r>
-              <a:rPr lang="en-US" sz="3200" dirty="0"/>
+              <a:rPr lang="en-US" sz="3200" dirty="0">
+                <a:latin typeface="Arial" panose="020B0604020202020204" pitchFamily="34" charset="0"/>
+                <a:cs typeface="Arial" panose="020B0604020202020204" pitchFamily="34" charset="0"/>
+              </a:rPr>
               <a:t> Is there a relationship between Occupation, home ownership, race/ethnicity and Marial Status, </a:t>
             </a:r>
             <a:r>
-              <a:rPr lang="en-US" sz="3200" dirty="0" err="1"/>
+              <a:rPr lang="en-US" sz="3200" dirty="0" err="1">
+                <a:latin typeface="Arial" panose="020B0604020202020204" pitchFamily="34" charset="0"/>
+                <a:cs typeface="Arial" panose="020B0604020202020204" pitchFamily="34" charset="0"/>
+              </a:rPr>
               <a:t>OccupationGroup</a:t>
             </a:r>
             <a:r>
-              <a:rPr lang="en-US" sz="3200" dirty="0"/>
+              <a:rPr lang="en-US" sz="3200" dirty="0">
+                <a:latin typeface="Arial" panose="020B0604020202020204" pitchFamily="34" charset="0"/>
+                <a:cs typeface="Arial" panose="020B0604020202020204" pitchFamily="34" charset="0"/>
+              </a:rPr>
               <a:t>, income?</a:t>
             </a:r>
           </a:p>
@@ -7587,7 +9192,7 @@
           </p:nvPr>
         </p:nvPicPr>
         <p:blipFill>
-          <a:blip r:embed="rId2"/>
+          <a:blip r:embed="rId3"/>
           <a:stretch>
             <a:fillRect/>
           </a:stretch>
@@ -7632,7 +9237,10 @@
               <a:buChar char="•"/>
             </a:pPr>
             <a:r>
-              <a:rPr lang="en-US" sz="2400" dirty="0"/>
+              <a:rPr lang="en-US" sz="2400" dirty="0">
+                <a:latin typeface="Arial" panose="020B0604020202020204" pitchFamily="34" charset="0"/>
+                <a:cs typeface="Arial" panose="020B0604020202020204" pitchFamily="34" charset="0"/>
+              </a:rPr>
               <a:t>We start by utilizing the model that we discovered in our research of question 1.</a:t>
             </a:r>
           </a:p>
@@ -7642,8 +9250,11 @@
               <a:buChar char="•"/>
             </a:pPr>
             <a:r>
-              <a:rPr lang="en-US" sz="2400" dirty="0"/>
-              <a:t>This was the best model between question 1 and 2 for least residuals sum of squares.</a:t>
+              <a:rPr lang="en-US" sz="2400" dirty="0">
+                <a:latin typeface="Arial" panose="020B0604020202020204" pitchFamily="34" charset="0"/>
+                <a:cs typeface="Arial" panose="020B0604020202020204" pitchFamily="34" charset="0"/>
+              </a:rPr>
+              <a:t>We went through many different explanatory variables to determine the best model to explain occupation.</a:t>
             </a:r>
           </a:p>
         </p:txBody>
@@ -7702,11 +9313,17 @@
           <a:lstStyle/>
           <a:p>
             <a:r>
-              <a:rPr lang="en-US" u="sng" dirty="0"/>
+              <a:rPr lang="en-US" u="sng" dirty="0">
+                <a:latin typeface="Arial" panose="020B0604020202020204" pitchFamily="34" charset="0"/>
+                <a:cs typeface="Arial" panose="020B0604020202020204" pitchFamily="34" charset="0"/>
+              </a:rPr>
               <a:t>Question 3:</a:t>
             </a:r>
             <a:r>
-              <a:rPr lang="en-US" dirty="0"/>
+              <a:rPr lang="en-US" dirty="0">
+                <a:latin typeface="Arial" panose="020B0604020202020204" pitchFamily="34" charset="0"/>
+                <a:cs typeface="Arial" panose="020B0604020202020204" pitchFamily="34" charset="0"/>
+              </a:rPr>
               <a:t> Interpretation</a:t>
             </a:r>
           </a:p>
@@ -7736,14 +9353,29 @@
           <a:lstStyle/>
           <a:p>
             <a:r>
-              <a:rPr lang="en-US" dirty="0"/>
-              <a:t>Based on the initial model we did find a relationship between these variables.</a:t>
-            </a:r>
-          </a:p>
-          <a:p>
-            <a:r>
-              <a:rPr lang="en-US" dirty="0"/>
-              <a:t>We also considered an interaction term-focused model between marital status and occupation group, which provides additional value to predicting home ownership.</a:t>
+              <a:rPr lang="en-US" dirty="0">
+                <a:latin typeface="Arial" panose="020B0604020202020204" pitchFamily="34" charset="0"/>
+                <a:cs typeface="Arial" panose="020B0604020202020204" pitchFamily="34" charset="0"/>
+              </a:rPr>
+              <a:t>We compared many different models with different explanatory variables  starting with the base model from question 1. </a:t>
+            </a:r>
+          </a:p>
+          <a:p>
+            <a:r>
+              <a:rPr lang="en-US" dirty="0">
+                <a:latin typeface="Arial" panose="020B0604020202020204" pitchFamily="34" charset="0"/>
+                <a:cs typeface="Arial" panose="020B0604020202020204" pitchFamily="34" charset="0"/>
+              </a:rPr>
+              <a:t>We were looking for the model that produced the best residual sum of squares for predictive power.</a:t>
+            </a:r>
+          </a:p>
+          <a:p>
+            <a:r>
+              <a:rPr lang="en-US" dirty="0">
+                <a:latin typeface="Arial" panose="020B0604020202020204" pitchFamily="34" charset="0"/>
+                <a:cs typeface="Arial" panose="020B0604020202020204" pitchFamily="34" charset="0"/>
+              </a:rPr>
+              <a:t>We also considered an interaction term-focused model between marital status and occupation group, which provides additional value to predicting occupation.</a:t>
             </a:r>
           </a:p>
         </p:txBody>
@@ -8015,4 +9647,299 @@
     </a:ext>
   </a:extLst>
 </a:theme>
+</file>
+
+<file path=ppt/theme/theme2.xml><?xml version="1.0" encoding="utf-8"?>
+<a:theme xmlns:a="http://schemas.openxmlformats.org/drawingml/2006/main" name="Office Theme">
+  <a:themeElements>
+    <a:clrScheme name="Office">
+      <a:dk1>
+        <a:sysClr val="windowText" lastClr="000000"/>
+      </a:dk1>
+      <a:lt1>
+        <a:sysClr val="window" lastClr="FFFFFF"/>
+      </a:lt1>
+      <a:dk2>
+        <a:srgbClr val="44546A"/>
+      </a:dk2>
+      <a:lt2>
+        <a:srgbClr val="E7E6E6"/>
+      </a:lt2>
+      <a:accent1>
+        <a:srgbClr val="4472C4"/>
+      </a:accent1>
+      <a:accent2>
+        <a:srgbClr val="ED7D31"/>
+      </a:accent2>
+      <a:accent3>
+        <a:srgbClr val="A5A5A5"/>
+      </a:accent3>
+      <a:accent4>
+        <a:srgbClr val="FFC000"/>
+      </a:accent4>
+      <a:accent5>
+        <a:srgbClr val="5B9BD5"/>
+      </a:accent5>
+      <a:accent6>
+        <a:srgbClr val="70AD47"/>
+      </a:accent6>
+      <a:hlink>
+        <a:srgbClr val="0563C1"/>
+      </a:hlink>
+      <a:folHlink>
+        <a:srgbClr val="954F72"/>
+      </a:folHlink>
+    </a:clrScheme>
+    <a:fontScheme name="Office">
+      <a:majorFont>
+        <a:latin typeface="Calibri Light" panose="020F0302020204030204"/>
+        <a:ea typeface=""/>
+        <a:cs typeface=""/>
+        <a:font script="Jpan" typeface="游ゴシック Light"/>
+        <a:font script="Hang" typeface="맑은 고딕"/>
+        <a:font script="Hans" typeface="等线 Light"/>
+        <a:font script="Hant" typeface="新細明體"/>
+        <a:font script="Arab" typeface="Times New Roman"/>
+        <a:font script="Hebr" typeface="Times New Roman"/>
+        <a:font script="Thai" typeface="Angsana New"/>
+        <a:font script="Ethi" typeface="Nyala"/>
+        <a:font script="Beng" typeface="Vrinda"/>
+        <a:font script="Gujr" typeface="Shruti"/>
+        <a:font script="Khmr" typeface="MoolBoran"/>
+        <a:font script="Knda" typeface="Tunga"/>
+        <a:font script="Guru" typeface="Raavi"/>
+        <a:font script="Cans" typeface="Euphemia"/>
+        <a:font script="Cher" typeface="Plantagenet Cherokee"/>
+        <a:font script="Yiii" typeface="Microsoft Yi Baiti"/>
+        <a:font script="Tibt" typeface="Microsoft Himalaya"/>
+        <a:font script="Thaa" typeface="MV Boli"/>
+        <a:font script="Deva" typeface="Mangal"/>
+        <a:font script="Telu" typeface="Gautami"/>
+        <a:font script="Taml" typeface="Latha"/>
+        <a:font script="Syrc" typeface="Estrangelo Edessa"/>
+        <a:font script="Orya" typeface="Kalinga"/>
+        <a:font script="Mlym" typeface="Kartika"/>
+        <a:font script="Laoo" typeface="DokChampa"/>
+        <a:font script="Sinh" typeface="Iskoola Pota"/>
+        <a:font script="Mong" typeface="Mongolian Baiti"/>
+        <a:font script="Viet" typeface="Times New Roman"/>
+        <a:font script="Uigh" typeface="Microsoft Uighur"/>
+        <a:font script="Geor" typeface="Sylfaen"/>
+        <a:font script="Armn" typeface="Arial"/>
+        <a:font script="Bugi" typeface="Leelawadee UI"/>
+        <a:font script="Bopo" typeface="Microsoft JhengHei"/>
+        <a:font script="Java" typeface="Javanese Text"/>
+        <a:font script="Lisu" typeface="Segoe UI"/>
+        <a:font script="Mymr" typeface="Myanmar Text"/>
+        <a:font script="Nkoo" typeface="Ebrima"/>
+        <a:font script="Olck" typeface="Nirmala UI"/>
+        <a:font script="Osma" typeface="Ebrima"/>
+        <a:font script="Phag" typeface="Phagspa"/>
+        <a:font script="Syrn" typeface="Estrangelo Edessa"/>
+        <a:font script="Syrj" typeface="Estrangelo Edessa"/>
+        <a:font script="Syre" typeface="Estrangelo Edessa"/>
+        <a:font script="Sora" typeface="Nirmala UI"/>
+        <a:font script="Tale" typeface="Microsoft Tai Le"/>
+        <a:font script="Talu" typeface="Microsoft New Tai Lue"/>
+        <a:font script="Tfng" typeface="Ebrima"/>
+      </a:majorFont>
+      <a:minorFont>
+        <a:latin typeface="Calibri" panose="020F0502020204030204"/>
+        <a:ea typeface=""/>
+        <a:cs typeface=""/>
+        <a:font script="Jpan" typeface="游ゴシック"/>
+        <a:font script="Hang" typeface="맑은 고딕"/>
+        <a:font script="Hans" typeface="等线"/>
+        <a:font script="Hant" typeface="新細明體"/>
+        <a:font script="Arab" typeface="Arial"/>
+        <a:font script="Hebr" typeface="Arial"/>
+        <a:font script="Thai" typeface="Cordia New"/>
+        <a:font script="Ethi" typeface="Nyala"/>
+        <a:font script="Beng" typeface="Vrinda"/>
+        <a:font script="Gujr" typeface="Shruti"/>
+        <a:font script="Khmr" typeface="DaunPenh"/>
+        <a:font script="Knda" typeface="Tunga"/>
+        <a:font script="Guru" typeface="Raavi"/>
+        <a:font script="Cans" typeface="Euphemia"/>
+        <a:font script="Cher" typeface="Plantagenet Cherokee"/>
+        <a:font script="Yiii" typeface="Microsoft Yi Baiti"/>
+        <a:font script="Tibt" typeface="Microsoft Himalaya"/>
+        <a:font script="Thaa" typeface="MV Boli"/>
+        <a:font script="Deva" typeface="Mangal"/>
+        <a:font script="Telu" typeface="Gautami"/>
+        <a:font script="Taml" typeface="Latha"/>
+        <a:font script="Syrc" typeface="Estrangelo Edessa"/>
+        <a:font script="Orya" typeface="Kalinga"/>
+        <a:font script="Mlym" typeface="Kartika"/>
+        <a:font script="Laoo" typeface="DokChampa"/>
+        <a:font script="Sinh" typeface="Iskoola Pota"/>
+        <a:font script="Mong" typeface="Mongolian Baiti"/>
+        <a:font script="Viet" typeface="Arial"/>
+        <a:font script="Uigh" typeface="Microsoft Uighur"/>
+        <a:font script="Geor" typeface="Sylfaen"/>
+        <a:font script="Armn" typeface="Arial"/>
+        <a:font script="Bugi" typeface="Leelawadee UI"/>
+        <a:font script="Bopo" typeface="Microsoft JhengHei"/>
+        <a:font script="Java" typeface="Javanese Text"/>
+        <a:font script="Lisu" typeface="Segoe UI"/>
+        <a:font script="Mymr" typeface="Myanmar Text"/>
+        <a:font script="Nkoo" typeface="Ebrima"/>
+        <a:font script="Olck" typeface="Nirmala UI"/>
+        <a:font script="Osma" typeface="Ebrima"/>
+        <a:font script="Phag" typeface="Phagspa"/>
+        <a:font script="Syrn" typeface="Estrangelo Edessa"/>
+        <a:font script="Syrj" typeface="Estrangelo Edessa"/>
+        <a:font script="Syre" typeface="Estrangelo Edessa"/>
+        <a:font script="Sora" typeface="Nirmala UI"/>
+        <a:font script="Tale" typeface="Microsoft Tai Le"/>
+        <a:font script="Talu" typeface="Microsoft New Tai Lue"/>
+        <a:font script="Tfng" typeface="Ebrima"/>
+      </a:minorFont>
+    </a:fontScheme>
+    <a:fmtScheme name="Office">
+      <a:fillStyleLst>
+        <a:solidFill>
+          <a:schemeClr val="phClr"/>
+        </a:solidFill>
+        <a:gradFill rotWithShape="1">
+          <a:gsLst>
+            <a:gs pos="0">
+              <a:schemeClr val="phClr">
+                <a:lumMod val="110000"/>
+                <a:satMod val="105000"/>
+                <a:tint val="67000"/>
+              </a:schemeClr>
+            </a:gs>
+            <a:gs pos="50000">
+              <a:schemeClr val="phClr">
+                <a:lumMod val="105000"/>
+                <a:satMod val="103000"/>
+                <a:tint val="73000"/>
+              </a:schemeClr>
+            </a:gs>
+            <a:gs pos="100000">
+              <a:schemeClr val="phClr">
+                <a:lumMod val="105000"/>
+                <a:satMod val="109000"/>
+                <a:tint val="81000"/>
+              </a:schemeClr>
+            </a:gs>
+          </a:gsLst>
+          <a:lin ang="5400000" scaled="0"/>
+        </a:gradFill>
+        <a:gradFill rotWithShape="1">
+          <a:gsLst>
+            <a:gs pos="0">
+              <a:schemeClr val="phClr">
+                <a:satMod val="103000"/>
+                <a:lumMod val="102000"/>
+                <a:tint val="94000"/>
+              </a:schemeClr>
+            </a:gs>
+            <a:gs pos="50000">
+              <a:schemeClr val="phClr">
+                <a:satMod val="110000"/>
+                <a:lumMod val="100000"/>
+                <a:shade val="100000"/>
+              </a:schemeClr>
+            </a:gs>
+            <a:gs pos="100000">
+              <a:schemeClr val="phClr">
+                <a:lumMod val="99000"/>
+                <a:satMod val="120000"/>
+                <a:shade val="78000"/>
+              </a:schemeClr>
+            </a:gs>
+          </a:gsLst>
+          <a:lin ang="5400000" scaled="0"/>
+        </a:gradFill>
+      </a:fillStyleLst>
+      <a:lnStyleLst>
+        <a:ln w="6350" cap="flat" cmpd="sng" algn="ctr">
+          <a:solidFill>
+            <a:schemeClr val="phClr"/>
+          </a:solidFill>
+          <a:prstDash val="solid"/>
+          <a:miter lim="800000"/>
+        </a:ln>
+        <a:ln w="12700" cap="flat" cmpd="sng" algn="ctr">
+          <a:solidFill>
+            <a:schemeClr val="phClr"/>
+          </a:solidFill>
+          <a:prstDash val="solid"/>
+          <a:miter lim="800000"/>
+        </a:ln>
+        <a:ln w="19050" cap="flat" cmpd="sng" algn="ctr">
+          <a:solidFill>
+            <a:schemeClr val="phClr"/>
+          </a:solidFill>
+          <a:prstDash val="solid"/>
+          <a:miter lim="800000"/>
+        </a:ln>
+      </a:lnStyleLst>
+      <a:effectStyleLst>
+        <a:effectStyle>
+          <a:effectLst/>
+        </a:effectStyle>
+        <a:effectStyle>
+          <a:effectLst/>
+        </a:effectStyle>
+        <a:effectStyle>
+          <a:effectLst>
+            <a:outerShdw blurRad="57150" dist="19050" dir="5400000" algn="ctr" rotWithShape="0">
+              <a:srgbClr val="000000">
+                <a:alpha val="63000"/>
+              </a:srgbClr>
+            </a:outerShdw>
+          </a:effectLst>
+        </a:effectStyle>
+      </a:effectStyleLst>
+      <a:bgFillStyleLst>
+        <a:solidFill>
+          <a:schemeClr val="phClr"/>
+        </a:solidFill>
+        <a:solidFill>
+          <a:schemeClr val="phClr">
+            <a:tint val="95000"/>
+            <a:satMod val="170000"/>
+          </a:schemeClr>
+        </a:solidFill>
+        <a:gradFill rotWithShape="1">
+          <a:gsLst>
+            <a:gs pos="0">
+              <a:schemeClr val="phClr">
+                <a:tint val="93000"/>
+                <a:satMod val="150000"/>
+                <a:shade val="98000"/>
+                <a:lumMod val="102000"/>
+              </a:schemeClr>
+            </a:gs>
+            <a:gs pos="50000">
+              <a:schemeClr val="phClr">
+                <a:tint val="98000"/>
+                <a:satMod val="130000"/>
+                <a:shade val="90000"/>
+                <a:lumMod val="103000"/>
+              </a:schemeClr>
+            </a:gs>
+            <a:gs pos="100000">
+              <a:schemeClr val="phClr">
+                <a:shade val="63000"/>
+                <a:satMod val="120000"/>
+              </a:schemeClr>
+            </a:gs>
+          </a:gsLst>
+          <a:lin ang="5400000" scaled="0"/>
+        </a:gradFill>
+      </a:bgFillStyleLst>
+    </a:fmtScheme>
+  </a:themeElements>
+  <a:objectDefaults/>
+  <a:extraClrSchemeLst/>
+  <a:extLst>
+    <a:ext uri="{05A4C25C-085E-4340-85A3-A5531E510DB2}">
+      <thm15:themeFamily xmlns:thm15="http://schemas.microsoft.com/office/thememl/2012/main" name="Office Theme" id="{62F939B6-93AF-4DB8-9C6B-D6C7DFDC589F}" vid="{4A3C46E8-61CC-4603-A589-7422A47A8E4A}"/>
+    </a:ext>
+  </a:extLst>
+</a:theme>
 </file>
</xml_diff>